<commit_message>
All R work converted to jupyter notebooks, latex and pds printed
</commit_message>
<xml_diff>
--- a/Presentation/Finnegan_Sr_Mgr_Learner_Eval&Analytics_Thought_Exercise.pptx
+++ b/Presentation/Finnegan_Sr_Mgr_Learner_Eval&Analytics_Thought_Exercise.pptx
@@ -5,14 +5,17 @@
     <p:sldMasterId id="2147483660" r:id="rId1"/>
   </p:sldMasterIdLst>
   <p:notesMasterIdLst>
-    <p:notesMasterId r:id="rId7"/>
+    <p:notesMasterId r:id="rId10"/>
   </p:notesMasterIdLst>
   <p:sldIdLst>
     <p:sldId id="256" r:id="rId2"/>
     <p:sldId id="257" r:id="rId3"/>
     <p:sldId id="259" r:id="rId4"/>
     <p:sldId id="260" r:id="rId5"/>
-    <p:sldId id="258" r:id="rId6"/>
+    <p:sldId id="261" r:id="rId6"/>
+    <p:sldId id="262" r:id="rId7"/>
+    <p:sldId id="263" r:id="rId8"/>
+    <p:sldId id="258" r:id="rId9"/>
   </p:sldIdLst>
   <p:sldSz cx="9144000" cy="5143500" type="screen16x9"/>
   <p:notesSz cx="6858000" cy="9144000"/>
@@ -9475,7 +9478,7 @@
         </p:nvSpPr>
         <p:spPr>
           <a:xfrm>
-            <a:off x="0" y="2100400"/>
+            <a:off x="0" y="2080377"/>
             <a:ext cx="9144000" cy="1438200"/>
           </a:xfrm>
           <a:prstGeom prst="rect">
@@ -9573,7 +9576,7 @@
             </a:pPr>
             <a:r>
               <a:rPr lang="en-US" dirty="0"/>
-              <a:t>File Pointers</a:t>
+              <a:t>File Pointers:</a:t>
             </a:r>
           </a:p>
         </p:txBody>
@@ -9596,36 +9599,44 @@
         </p:nvSpPr>
         <p:spPr/>
         <p:txBody>
-          <a:bodyPr/>
+          <a:bodyPr>
+            <a:normAutofit/>
+          </a:bodyPr>
           <a:lstStyle/>
           <a:p>
             <a:r>
-              <a:rPr lang="en-US" dirty="0"/>
-              <a:t>Code Repository:</a:t>
+              <a:rPr lang="en-US" sz="1800" b="1" dirty="0"/>
+              <a:t>Code repository, presentation, documentation:</a:t>
             </a:r>
           </a:p>
           <a:p>
             <a:pPr lvl="1"/>
             <a:r>
-              <a:rPr lang="en-US" dirty="0">
+              <a:rPr lang="en-US" sz="1600" dirty="0">
                 <a:hlinkClick r:id="rId3"/>
               </a:rPr>
               <a:t>https://github.com/flipsmash/PS_demo</a:t>
             </a:r>
-            <a:endParaRPr lang="en-US" dirty="0"/>
+            <a:br>
+              <a:rPr lang="en-US" sz="1600" dirty="0"/>
+            </a:br>
+            <a:endParaRPr lang="en-US" sz="1600" dirty="0"/>
           </a:p>
           <a:p>
             <a:r>
-              <a:rPr lang="en-US" dirty="0"/>
-              <a:t>Visualization:</a:t>
+              <a:rPr lang="en-US" sz="1800" b="1" dirty="0"/>
+              <a:t>Visualizations:</a:t>
             </a:r>
           </a:p>
           <a:p>
             <a:pPr lvl="1"/>
             <a:r>
-              <a:rPr lang="en-US" dirty="0"/>
-              <a:t>TBA</a:t>
+              <a:rPr lang="en-US" sz="1600" dirty="0">
+                <a:hlinkClick r:id="rId4"/>
+              </a:rPr>
+              <a:t>https://public.tableau.com/app/profile/brian.finnegan/vizzes</a:t>
             </a:r>
+            <a:endParaRPr lang="en-US" sz="1600" dirty="0"/>
           </a:p>
         </p:txBody>
       </p:sp>
@@ -9711,11 +9722,21 @@
         <p:spPr>
           <a:xfrm>
             <a:off x="311699" y="1496000"/>
-            <a:ext cx="3999900" cy="3416400"/>
+            <a:ext cx="3999900" cy="2355159"/>
           </a:xfrm>
+          <a:ln>
+            <a:solidFill>
+              <a:schemeClr val="tx1">
+                <a:lumMod val="60000"/>
+                <a:lumOff val="40000"/>
+              </a:schemeClr>
+            </a:solidFill>
+          </a:ln>
         </p:spPr>
         <p:txBody>
-          <a:bodyPr/>
+          <a:bodyPr>
+            <a:normAutofit fontScale="92500" lnSpcReduction="10000"/>
+          </a:bodyPr>
           <a:lstStyle/>
           <a:p>
             <a:pPr marL="139700" indent="0">
@@ -9772,6 +9793,14 @@
                 <a:sym typeface="Wingdings" panose="05000000000000000000" pitchFamily="2" charset="2"/>
               </a:rPr>
               <a:t> Python  Tableau  Python, R</a:t>
+            </a:r>
+          </a:p>
+          <a:p>
+            <a:r>
+              <a:rPr lang="en-US" dirty="0">
+                <a:sym typeface="Wingdings" panose="05000000000000000000" pitchFamily="2" charset="2"/>
+              </a:rPr>
+              <a:t>Clean  Prep  Explore, Viz  Analyze, Viz &amp; Evaluate</a:t>
             </a:r>
             <a:endParaRPr lang="en-US" dirty="0"/>
           </a:p>
@@ -9796,11 +9825,22 @@
         <p:spPr>
           <a:xfrm>
             <a:off x="4745659" y="1496000"/>
-            <a:ext cx="4260516" cy="3416400"/>
+            <a:ext cx="4260516" cy="2355159"/>
           </a:xfrm>
+          <a:noFill/>
+          <a:ln>
+            <a:solidFill>
+              <a:schemeClr val="tx1">
+                <a:lumMod val="60000"/>
+                <a:lumOff val="40000"/>
+              </a:schemeClr>
+            </a:solidFill>
+          </a:ln>
         </p:spPr>
         <p:txBody>
-          <a:bodyPr/>
+          <a:bodyPr spcFirstLastPara="1" wrap="square" lIns="91425" tIns="91425" rIns="91425" bIns="91425" anchor="t" anchorCtr="0">
+            <a:normAutofit/>
+          </a:bodyPr>
           <a:lstStyle/>
           <a:p>
             <a:pPr marL="139700" indent="0">
@@ -9813,41 +9853,41 @@
           </a:p>
           <a:p>
             <a:r>
-              <a:rPr lang="en-US" dirty="0"/>
+              <a:rPr lang="en-US" sz="1300" dirty="0"/>
               <a:t>Plan to spend twice+ as long on cleaning as you want / expect to</a:t>
             </a:r>
           </a:p>
           <a:p>
             <a:r>
-              <a:rPr lang="en-US" dirty="0"/>
-              <a:t>80/20 rule</a:t>
+              <a:rPr lang="en-US" sz="1300" dirty="0"/>
+              <a:t>80/20 rule: simple gets you 80% of payout</a:t>
             </a:r>
           </a:p>
           <a:p>
+            <a:pPr marL="139700" indent="0">
+              <a:buNone/>
+            </a:pPr>
             <a:r>
-              <a:rPr lang="en-US" dirty="0"/>
+              <a:rPr lang="en-US" b="1" u="sng" dirty="0"/>
               <a:t>Assumptions</a:t>
             </a:r>
           </a:p>
           <a:p>
-            <a:pPr lvl="1"/>
             <a:r>
-              <a:rPr lang="en-US" dirty="0"/>
+              <a:rPr lang="en-US" sz="1300" dirty="0"/>
               <a:t>Your time is precious, so I took data as given</a:t>
             </a:r>
           </a:p>
           <a:p>
-            <a:pPr lvl="1"/>
             <a:r>
-              <a:rPr lang="en-US" dirty="0"/>
+              <a:rPr lang="en-US" sz="1300" dirty="0"/>
               <a:t>Forensics, not discovery</a:t>
             </a:r>
           </a:p>
           <a:p>
-            <a:pPr lvl="1"/>
             <a:r>
-              <a:rPr lang="en-US" dirty="0"/>
-              <a:t>Exactly the opposite of real practice</a:t>
+              <a:rPr lang="en-US" sz="1300" dirty="0"/>
+              <a:t>[Exactly the opposite of real practice]</a:t>
             </a:r>
           </a:p>
         </p:txBody>
@@ -10059,10 +10099,15 @@
             <p:ph type="body" idx="1"/>
           </p:nvPr>
         </p:nvSpPr>
-        <p:spPr/>
+        <p:spPr>
+          <a:xfrm>
+            <a:off x="325048" y="1304822"/>
+            <a:ext cx="4520605" cy="3416400"/>
+          </a:xfrm>
+        </p:spPr>
         <p:txBody>
           <a:bodyPr>
-            <a:normAutofit lnSpcReduction="10000"/>
+            <a:normAutofit/>
           </a:bodyPr>
           <a:lstStyle/>
           <a:p>
@@ -10070,63 +10115,106 @@
               <a:buNone/>
             </a:pPr>
             <a:r>
-              <a:rPr lang="en-US" b="1" u="sng" dirty="0"/>
+              <a:rPr lang="en-US" sz="1300" b="1" u="sng" dirty="0"/>
               <a:t>Issues</a:t>
             </a:r>
           </a:p>
           <a:p>
+            <a:pPr>
+              <a:lnSpc>
+                <a:spcPct val="125000"/>
+              </a:lnSpc>
+            </a:pPr>
             <a:r>
-              <a:rPr lang="en-US" dirty="0"/>
+              <a:rPr lang="en-US" sz="1300" dirty="0"/>
               <a:t>Anomalous Values</a:t>
             </a:r>
           </a:p>
           <a:p>
-            <a:pPr lvl="1"/>
+            <a:pPr lvl="1">
+              <a:lnSpc>
+                <a:spcPct val="125000"/>
+              </a:lnSpc>
+            </a:pPr>
             <a:r>
               <a:rPr lang="en-US" dirty="0"/>
               <a:t>Q1, Q14 scores &amp; the “Dirty 50”</a:t>
             </a:r>
           </a:p>
           <a:p>
-            <a:pPr lvl="1"/>
+            <a:pPr lvl="1">
+              <a:lnSpc>
+                <a:spcPct val="125000"/>
+              </a:lnSpc>
+            </a:pPr>
             <a:r>
               <a:rPr lang="en-US" dirty="0"/>
               <a:t>Datetime fields: Inconsistent relative to one another &amp; often far in future</a:t>
             </a:r>
           </a:p>
           <a:p>
+            <a:pPr>
+              <a:lnSpc>
+                <a:spcPct val="125000"/>
+              </a:lnSpc>
+            </a:pPr>
             <a:r>
-              <a:rPr lang="en-US" dirty="0"/>
+              <a:rPr lang="en-US" sz="1300" dirty="0"/>
               <a:t>De-identify Candidate ID</a:t>
             </a:r>
           </a:p>
           <a:p>
+            <a:pPr>
+              <a:lnSpc>
+                <a:spcPct val="125000"/>
+              </a:lnSpc>
+            </a:pPr>
             <a:r>
-              <a:rPr lang="en-US" dirty="0"/>
+              <a:rPr lang="en-US" sz="1300" dirty="0"/>
               <a:t>Delete invariant &amp; computed fields esp. Tag scores</a:t>
             </a:r>
           </a:p>
           <a:p>
+            <a:pPr>
+              <a:lnSpc>
+                <a:spcPct val="125000"/>
+              </a:lnSpc>
+            </a:pPr>
             <a:r>
-              <a:rPr lang="en-US" dirty="0"/>
+              <a:rPr lang="en-US" sz="1300" dirty="0"/>
               <a:t>Add question-tag relationship table for future joins</a:t>
             </a:r>
           </a:p>
           <a:p>
+            <a:pPr>
+              <a:lnSpc>
+                <a:spcPct val="125000"/>
+              </a:lnSpc>
+            </a:pPr>
             <a:r>
-              <a:rPr lang="en-US" dirty="0"/>
+              <a:rPr lang="en-US" sz="1300" dirty="0"/>
               <a:t>Sort out major versus city</a:t>
             </a:r>
           </a:p>
           <a:p>
+            <a:pPr>
+              <a:lnSpc>
+                <a:spcPct val="125000"/>
+              </a:lnSpc>
+            </a:pPr>
             <a:r>
-              <a:rPr lang="en-US" dirty="0"/>
+              <a:rPr lang="en-US" sz="1300" dirty="0"/>
               <a:t>Impute state from city via GPT</a:t>
             </a:r>
           </a:p>
           <a:p>
+            <a:pPr>
+              <a:lnSpc>
+                <a:spcPct val="125000"/>
+              </a:lnSpc>
+            </a:pPr>
             <a:r>
-              <a:rPr lang="en-US" dirty="0"/>
+              <a:rPr lang="en-US" sz="1300" dirty="0"/>
               <a:t>Clean, consolidate &amp; classify majors - GPT</a:t>
             </a:r>
           </a:p>
@@ -10151,7 +10239,12 @@
             <p:ph type="body" idx="2"/>
           </p:nvPr>
         </p:nvSpPr>
-        <p:spPr/>
+        <p:spPr>
+          <a:xfrm>
+            <a:off x="4799371" y="1333451"/>
+            <a:ext cx="3999900" cy="3416400"/>
+          </a:xfrm>
+        </p:spPr>
         <p:txBody>
           <a:bodyPr/>
           <a:lstStyle/>
@@ -10160,33 +10253,71 @@
               <a:buNone/>
             </a:pPr>
             <a:r>
-              <a:rPr lang="en-US" b="1" u="sng" dirty="0"/>
+              <a:rPr lang="en-US" sz="1300" b="1" u="sng" dirty="0"/>
               <a:t>Insights &amp; Questions</a:t>
             </a:r>
           </a:p>
           <a:p>
+            <a:pPr>
+              <a:lnSpc>
+                <a:spcPct val="125000"/>
+              </a:lnSpc>
+            </a:pPr>
             <a:r>
-              <a:rPr lang="en-US" dirty="0"/>
+              <a:rPr lang="en-US" sz="1300" dirty="0"/>
               <a:t>Utility of Q1 / Create &amp; insert section?</a:t>
             </a:r>
           </a:p>
           <a:p>
+            <a:pPr>
+              <a:lnSpc>
+                <a:spcPct val="125000"/>
+              </a:lnSpc>
+            </a:pPr>
             <a:r>
-              <a:rPr lang="en-US" dirty="0"/>
+              <a:rPr lang="en-US" sz="1300" dirty="0"/>
               <a:t>Partial credit scoring for Q2-Q14?</a:t>
             </a:r>
           </a:p>
           <a:p>
+            <a:pPr>
+              <a:lnSpc>
+                <a:spcPct val="125000"/>
+              </a:lnSpc>
+            </a:pPr>
             <a:r>
-              <a:rPr lang="en-US" dirty="0"/>
-              <a:t>Are assessment data resulting from manual copy &amp; paste?</a:t>
+              <a:rPr lang="en-US" sz="1300" dirty="0"/>
+              <a:t>Are assessment data resulting from manual copy &amp; paste or are errors injected for training?</a:t>
             </a:r>
           </a:p>
           <a:p>
-            <a:endParaRPr lang="en-US" dirty="0"/>
-          </a:p>
-          <a:p>
-            <a:endParaRPr lang="en-US" dirty="0"/>
+            <a:pPr>
+              <a:lnSpc>
+                <a:spcPct val="125000"/>
+              </a:lnSpc>
+            </a:pPr>
+            <a:r>
+              <a:rPr lang="en-US" sz="1300" dirty="0"/>
+              <a:t>Date-times: I surrender!</a:t>
+            </a:r>
+          </a:p>
+          <a:p>
+            <a:pPr>
+              <a:lnSpc>
+                <a:spcPct val="125000"/>
+              </a:lnSpc>
+            </a:pPr>
+            <a:r>
+              <a:rPr lang="en-US" sz="1300" dirty="0"/>
+              <a:t>Eye-openers:  Minnesota and non-majors</a:t>
+            </a:r>
+            <a:br>
+              <a:rPr lang="en-US" sz="1300" dirty="0"/>
+            </a:br>
+            <a:r>
+              <a:rPr lang="en-US" sz="1300" dirty="0"/>
+              <a:t>[See Tableau vizzes 1&amp;2]</a:t>
+            </a:r>
           </a:p>
         </p:txBody>
       </p:sp>
@@ -10291,6 +10422,538 @@
       </p:grpSpPr>
       <p:sp>
         <p:nvSpPr>
+          <p:cNvPr id="6" name="Title 5">
+            <a:extLst>
+              <a:ext uri="{FF2B5EF4-FFF2-40B4-BE49-F238E27FC236}">
+                <a16:creationId xmlns:a16="http://schemas.microsoft.com/office/drawing/2014/main" id="{CA1AF9D1-1475-DB66-4B53-221F8B009218}"/>
+              </a:ext>
+            </a:extLst>
+          </p:cNvPr>
+          <p:cNvSpPr>
+            <a:spLocks noGrp="1"/>
+          </p:cNvSpPr>
+          <p:nvPr>
+            <p:ph type="title"/>
+          </p:nvPr>
+        </p:nvSpPr>
+        <p:spPr/>
+        <p:txBody>
+          <a:bodyPr/>
+          <a:lstStyle/>
+          <a:p>
+            <a:pPr>
+              <a:buNone/>
+            </a:pPr>
+            <a:r>
+              <a:rPr lang="en-US" dirty="0"/>
+              <a:t>Exploratory Visualizations</a:t>
+            </a:r>
+          </a:p>
+        </p:txBody>
+      </p:sp>
+      <p:sp>
+        <p:nvSpPr>
+          <p:cNvPr id="7" name="Text Placeholder 6">
+            <a:extLst>
+              <a:ext uri="{FF2B5EF4-FFF2-40B4-BE49-F238E27FC236}">
+                <a16:creationId xmlns:a16="http://schemas.microsoft.com/office/drawing/2014/main" id="{97B65F39-7717-C8D4-AF71-7319EFAEA8FF}"/>
+              </a:ext>
+            </a:extLst>
+          </p:cNvPr>
+          <p:cNvSpPr>
+            <a:spLocks noGrp="1"/>
+          </p:cNvSpPr>
+          <p:nvPr>
+            <p:ph type="body" idx="1"/>
+          </p:nvPr>
+        </p:nvSpPr>
+        <p:spPr/>
+        <p:txBody>
+          <a:bodyPr/>
+          <a:lstStyle/>
+          <a:p>
+            <a:r>
+              <a:rPr lang="en-US" dirty="0"/>
+              <a:t>Single Variable</a:t>
+            </a:r>
+          </a:p>
+          <a:p>
+            <a:pPr lvl="1"/>
+            <a:r>
+              <a:rPr lang="en-US" dirty="0"/>
+              <a:t>Scores</a:t>
+            </a:r>
+          </a:p>
+          <a:p>
+            <a:r>
+              <a:rPr lang="en-US" dirty="0"/>
+              <a:t>Relationships</a:t>
+            </a:r>
+          </a:p>
+          <a:p>
+            <a:pPr lvl="1"/>
+            <a:r>
+              <a:rPr lang="en-US" dirty="0"/>
+              <a:t>Copy/paste vs score</a:t>
+            </a:r>
+          </a:p>
+          <a:p>
+            <a:pPr lvl="1"/>
+            <a:r>
+              <a:rPr lang="en-US" dirty="0"/>
+              <a:t>Out of window vs score</a:t>
+            </a:r>
+          </a:p>
+          <a:p>
+            <a:pPr lvl="1"/>
+            <a:r>
+              <a:rPr lang="en-US" dirty="0"/>
+              <a:t>Test items by tags</a:t>
+            </a:r>
+          </a:p>
+        </p:txBody>
+      </p:sp>
+      <p:sp>
+        <p:nvSpPr>
+          <p:cNvPr id="5" name="Slide Number Placeholder 4">
+            <a:extLst>
+              <a:ext uri="{FF2B5EF4-FFF2-40B4-BE49-F238E27FC236}">
+                <a16:creationId xmlns:a16="http://schemas.microsoft.com/office/drawing/2014/main" id="{36664EC1-1E74-F995-0EBD-ED70BBEFCD06}"/>
+              </a:ext>
+            </a:extLst>
+          </p:cNvPr>
+          <p:cNvSpPr>
+            <a:spLocks noGrp="1"/>
+          </p:cNvSpPr>
+          <p:nvPr>
+            <p:ph type="sldNum" idx="12"/>
+          </p:nvPr>
+        </p:nvSpPr>
+        <p:spPr/>
+        <p:txBody>
+          <a:bodyPr/>
+          <a:lstStyle/>
+          <a:p>
+            <a:pPr marL="0" lvl="0" indent="0" algn="r" rtl="0">
+              <a:spcBef>
+                <a:spcPts val="0"/>
+              </a:spcBef>
+              <a:spcAft>
+                <a:spcPts val="0"/>
+              </a:spcAft>
+              <a:buNone/>
+            </a:pPr>
+            <a:fld id="{00000000-1234-1234-1234-123412341234}" type="slidenum">
+              <a:rPr lang="en" smtClean="0"/>
+              <a:t>5</a:t>
+            </a:fld>
+            <a:endParaRPr lang="en"/>
+          </a:p>
+        </p:txBody>
+      </p:sp>
+    </p:spTree>
+    <p:extLst>
+      <p:ext uri="{BB962C8B-B14F-4D97-AF65-F5344CB8AC3E}">
+        <p14:creationId xmlns:p14="http://schemas.microsoft.com/office/powerpoint/2010/main" val="4272527371"/>
+      </p:ext>
+    </p:extLst>
+  </p:cSld>
+  <p:clrMapOvr>
+    <a:masterClrMapping/>
+  </p:clrMapOvr>
+</p:sld>
+</file>
+
+<file path=ppt/slides/slide6.xml><?xml version="1.0" encoding="utf-8"?>
+<p:sld xmlns:a="http://schemas.openxmlformats.org/drawingml/2006/main" xmlns:r="http://schemas.openxmlformats.org/officeDocument/2006/relationships" xmlns:p="http://schemas.openxmlformats.org/presentationml/2006/main">
+  <p:cSld>
+    <p:spTree>
+      <p:nvGrpSpPr>
+        <p:cNvPr id="1" name=""/>
+        <p:cNvGrpSpPr/>
+        <p:nvPr/>
+      </p:nvGrpSpPr>
+      <p:grpSpPr>
+        <a:xfrm>
+          <a:off x="0" y="0"/>
+          <a:ext cx="0" cy="0"/>
+          <a:chOff x="0" y="0"/>
+          <a:chExt cx="0" cy="0"/>
+        </a:xfrm>
+      </p:grpSpPr>
+      <p:sp>
+        <p:nvSpPr>
+          <p:cNvPr id="2" name="Title 1">
+            <a:extLst>
+              <a:ext uri="{FF2B5EF4-FFF2-40B4-BE49-F238E27FC236}">
+                <a16:creationId xmlns:a16="http://schemas.microsoft.com/office/drawing/2014/main" id="{79D29577-7022-76A8-D2CE-524115259ACA}"/>
+              </a:ext>
+            </a:extLst>
+          </p:cNvPr>
+          <p:cNvSpPr>
+            <a:spLocks noGrp="1"/>
+          </p:cNvSpPr>
+          <p:nvPr>
+            <p:ph type="title"/>
+          </p:nvPr>
+        </p:nvSpPr>
+        <p:spPr/>
+        <p:txBody>
+          <a:bodyPr/>
+          <a:lstStyle/>
+          <a:p>
+            <a:pPr>
+              <a:buNone/>
+            </a:pPr>
+            <a:r>
+              <a:rPr lang="en-US" dirty="0"/>
+              <a:t>Analysis &amp; Evaluation</a:t>
+            </a:r>
+          </a:p>
+        </p:txBody>
+      </p:sp>
+      <p:sp>
+        <p:nvSpPr>
+          <p:cNvPr id="3" name="Text Placeholder 2">
+            <a:extLst>
+              <a:ext uri="{FF2B5EF4-FFF2-40B4-BE49-F238E27FC236}">
+                <a16:creationId xmlns:a16="http://schemas.microsoft.com/office/drawing/2014/main" id="{EC635F1E-AB4E-8717-0860-111ADB49FA6C}"/>
+              </a:ext>
+            </a:extLst>
+          </p:cNvPr>
+          <p:cNvSpPr>
+            <a:spLocks noGrp="1"/>
+          </p:cNvSpPr>
+          <p:nvPr>
+            <p:ph type="body" idx="1"/>
+          </p:nvPr>
+        </p:nvSpPr>
+        <p:spPr/>
+        <p:txBody>
+          <a:bodyPr/>
+          <a:lstStyle/>
+          <a:p>
+            <a:r>
+              <a:rPr lang="en-US" dirty="0"/>
+              <a:t>Copy/paste plagiarism?</a:t>
+            </a:r>
+          </a:p>
+          <a:p>
+            <a:pPr lvl="1"/>
+            <a:r>
+              <a:rPr lang="en-US" dirty="0"/>
+              <a:t>Mann-Whitney (non-parametric t-test) on copiers vs non-copiers</a:t>
+            </a:r>
+          </a:p>
+          <a:p>
+            <a:pPr lvl="1"/>
+            <a:r>
+              <a:rPr lang="en-US" dirty="0"/>
+              <a:t>Simple OLS regression </a:t>
+            </a:r>
+          </a:p>
+          <a:p>
+            <a:r>
+              <a:rPr lang="en-US" dirty="0"/>
+              <a:t>Item-level analysis</a:t>
+            </a:r>
+          </a:p>
+          <a:p>
+            <a:pPr lvl="1"/>
+            <a:r>
+              <a:rPr lang="en-US" dirty="0"/>
+              <a:t>Mean scores per question</a:t>
+            </a:r>
+          </a:p>
+          <a:p>
+            <a:pPr lvl="1"/>
+            <a:r>
+              <a:rPr lang="en-US" dirty="0"/>
+              <a:t>Correlation with overall test</a:t>
+            </a:r>
+          </a:p>
+          <a:p>
+            <a:pPr lvl="1"/>
+            <a:r>
+              <a:rPr lang="en-US" dirty="0"/>
+              <a:t>Item Level Analysis</a:t>
+            </a:r>
+          </a:p>
+        </p:txBody>
+      </p:sp>
+      <p:sp>
+        <p:nvSpPr>
+          <p:cNvPr id="4" name="Slide Number Placeholder 3">
+            <a:extLst>
+              <a:ext uri="{FF2B5EF4-FFF2-40B4-BE49-F238E27FC236}">
+                <a16:creationId xmlns:a16="http://schemas.microsoft.com/office/drawing/2014/main" id="{83BBD708-CC9E-7A1D-EFAA-AF01E193E7EF}"/>
+              </a:ext>
+            </a:extLst>
+          </p:cNvPr>
+          <p:cNvSpPr>
+            <a:spLocks noGrp="1"/>
+          </p:cNvSpPr>
+          <p:nvPr>
+            <p:ph type="sldNum" idx="12"/>
+          </p:nvPr>
+        </p:nvSpPr>
+        <p:spPr/>
+        <p:txBody>
+          <a:bodyPr/>
+          <a:lstStyle/>
+          <a:p>
+            <a:pPr marL="0" lvl="0" indent="0" algn="r" rtl="0">
+              <a:spcBef>
+                <a:spcPts val="0"/>
+              </a:spcBef>
+              <a:spcAft>
+                <a:spcPts val="0"/>
+              </a:spcAft>
+              <a:buNone/>
+            </a:pPr>
+            <a:fld id="{00000000-1234-1234-1234-123412341234}" type="slidenum">
+              <a:rPr lang="en" smtClean="0"/>
+              <a:t>6</a:t>
+            </a:fld>
+            <a:endParaRPr lang="en"/>
+          </a:p>
+        </p:txBody>
+      </p:sp>
+    </p:spTree>
+    <p:extLst>
+      <p:ext uri="{BB962C8B-B14F-4D97-AF65-F5344CB8AC3E}">
+        <p14:creationId xmlns:p14="http://schemas.microsoft.com/office/powerpoint/2010/main" val="738998"/>
+      </p:ext>
+    </p:extLst>
+  </p:cSld>
+  <p:clrMapOvr>
+    <a:masterClrMapping/>
+  </p:clrMapOvr>
+</p:sld>
+</file>
+
+<file path=ppt/slides/slide7.xml><?xml version="1.0" encoding="utf-8"?>
+<p:sld xmlns:a="http://schemas.openxmlformats.org/drawingml/2006/main" xmlns:r="http://schemas.openxmlformats.org/officeDocument/2006/relationships" xmlns:p="http://schemas.openxmlformats.org/presentationml/2006/main">
+  <p:cSld>
+    <p:spTree>
+      <p:nvGrpSpPr>
+        <p:cNvPr id="1" name=""/>
+        <p:cNvGrpSpPr/>
+        <p:nvPr/>
+      </p:nvGrpSpPr>
+      <p:grpSpPr>
+        <a:xfrm>
+          <a:off x="0" y="0"/>
+          <a:ext cx="0" cy="0"/>
+          <a:chOff x="0" y="0"/>
+          <a:chExt cx="0" cy="0"/>
+        </a:xfrm>
+      </p:grpSpPr>
+      <p:sp>
+        <p:nvSpPr>
+          <p:cNvPr id="2" name="Title 1">
+            <a:extLst>
+              <a:ext uri="{FF2B5EF4-FFF2-40B4-BE49-F238E27FC236}">
+                <a16:creationId xmlns:a16="http://schemas.microsoft.com/office/drawing/2014/main" id="{DE58CF22-EC68-B235-8556-78BC1D35AF47}"/>
+              </a:ext>
+            </a:extLst>
+          </p:cNvPr>
+          <p:cNvSpPr>
+            <a:spLocks noGrp="1"/>
+          </p:cNvSpPr>
+          <p:nvPr>
+            <p:ph type="title"/>
+          </p:nvPr>
+        </p:nvSpPr>
+        <p:spPr/>
+        <p:txBody>
+          <a:bodyPr/>
+          <a:lstStyle/>
+          <a:p>
+            <a:pPr>
+              <a:buNone/>
+            </a:pPr>
+            <a:r>
+              <a:rPr lang="en-US" dirty="0"/>
+              <a:t>Limitations and Conclusions</a:t>
+            </a:r>
+          </a:p>
+        </p:txBody>
+      </p:sp>
+      <p:sp>
+        <p:nvSpPr>
+          <p:cNvPr id="3" name="Text Placeholder 2">
+            <a:extLst>
+              <a:ext uri="{FF2B5EF4-FFF2-40B4-BE49-F238E27FC236}">
+                <a16:creationId xmlns:a16="http://schemas.microsoft.com/office/drawing/2014/main" id="{6A541FAF-4FB3-971F-C9F3-4021529A4E2E}"/>
+              </a:ext>
+            </a:extLst>
+          </p:cNvPr>
+          <p:cNvSpPr>
+            <a:spLocks noGrp="1"/>
+          </p:cNvSpPr>
+          <p:nvPr>
+            <p:ph type="body" idx="1"/>
+          </p:nvPr>
+        </p:nvSpPr>
+        <p:spPr/>
+        <p:txBody>
+          <a:bodyPr/>
+          <a:lstStyle/>
+          <a:p>
+            <a:r>
+              <a:rPr lang="en-US" dirty="0"/>
+              <a:t>Familiarity with data and their context limited – huge consideration</a:t>
+            </a:r>
+          </a:p>
+          <a:p>
+            <a:r>
+              <a:rPr lang="en-US" dirty="0"/>
+              <a:t>Hints, glimpses, &amp; issues for investigation only; no conclusions</a:t>
+            </a:r>
+          </a:p>
+          <a:p>
+            <a:pPr lvl="1"/>
+            <a:r>
+              <a:rPr lang="en-US" dirty="0"/>
+              <a:t>Participant preparedness / performance?</a:t>
+            </a:r>
+          </a:p>
+          <a:p>
+            <a:pPr lvl="1"/>
+            <a:r>
+              <a:rPr lang="en-US" dirty="0"/>
+              <a:t>Local teaching &amp; learning and/or participant supply circumstances?</a:t>
+            </a:r>
+          </a:p>
+          <a:p>
+            <a:pPr lvl="1"/>
+            <a:r>
+              <a:rPr lang="en-US" dirty="0"/>
+              <a:t>Copy &amp; paste an issue?</a:t>
+            </a:r>
+          </a:p>
+          <a:p>
+            <a:pPr lvl="1"/>
+            <a:r>
+              <a:rPr lang="en-US" dirty="0"/>
+              <a:t>Possible test effectiveness opportunities?</a:t>
+            </a:r>
+          </a:p>
+          <a:p>
+            <a:r>
+              <a:rPr lang="en-US" dirty="0"/>
+              <a:t>What </a:t>
+            </a:r>
+            <a:r>
+              <a:rPr lang="en-US" i="1" dirty="0"/>
+              <a:t>is</a:t>
+            </a:r>
+            <a:r>
+              <a:rPr lang="en-US" dirty="0"/>
+              <a:t> clear</a:t>
+            </a:r>
+          </a:p>
+          <a:p>
+            <a:pPr lvl="1"/>
+            <a:r>
+              <a:rPr lang="en-US" dirty="0"/>
+              <a:t>80/20 rule &amp; cleaning/wrangling as biggest time/effort sink!</a:t>
+            </a:r>
+          </a:p>
+          <a:p>
+            <a:r>
+              <a:rPr lang="en-US" dirty="0"/>
+              <a:t>What I </a:t>
+            </a:r>
+            <a:r>
+              <a:rPr lang="en-US" i="1" dirty="0"/>
+              <a:t>hope</a:t>
+            </a:r>
+            <a:r>
+              <a:rPr lang="en-US" dirty="0"/>
+              <a:t> is also clear</a:t>
+            </a:r>
+          </a:p>
+          <a:p>
+            <a:pPr lvl="1"/>
+            <a:r>
+              <a:rPr lang="en-US" dirty="0"/>
+              <a:t>My robust, versatile data analysis skills and experience in related contexts</a:t>
+            </a:r>
+          </a:p>
+        </p:txBody>
+      </p:sp>
+      <p:sp>
+        <p:nvSpPr>
+          <p:cNvPr id="4" name="Slide Number Placeholder 3">
+            <a:extLst>
+              <a:ext uri="{FF2B5EF4-FFF2-40B4-BE49-F238E27FC236}">
+                <a16:creationId xmlns:a16="http://schemas.microsoft.com/office/drawing/2014/main" id="{8769B7BF-3A8B-F5DD-F9C0-F1B9A45CCF26}"/>
+              </a:ext>
+            </a:extLst>
+          </p:cNvPr>
+          <p:cNvSpPr>
+            <a:spLocks noGrp="1"/>
+          </p:cNvSpPr>
+          <p:nvPr>
+            <p:ph type="sldNum" idx="12"/>
+          </p:nvPr>
+        </p:nvSpPr>
+        <p:spPr/>
+        <p:txBody>
+          <a:bodyPr/>
+          <a:lstStyle/>
+          <a:p>
+            <a:pPr marL="0" lvl="0" indent="0" algn="r" rtl="0">
+              <a:spcBef>
+                <a:spcPts val="0"/>
+              </a:spcBef>
+              <a:spcAft>
+                <a:spcPts val="0"/>
+              </a:spcAft>
+              <a:buNone/>
+            </a:pPr>
+            <a:fld id="{00000000-1234-1234-1234-123412341234}" type="slidenum">
+              <a:rPr lang="en" smtClean="0"/>
+              <a:t>7</a:t>
+            </a:fld>
+            <a:endParaRPr lang="en"/>
+          </a:p>
+        </p:txBody>
+      </p:sp>
+    </p:spTree>
+    <p:extLst>
+      <p:ext uri="{BB962C8B-B14F-4D97-AF65-F5344CB8AC3E}">
+        <p14:creationId xmlns:p14="http://schemas.microsoft.com/office/powerpoint/2010/main" val="21052985"/>
+      </p:ext>
+    </p:extLst>
+  </p:cSld>
+  <p:clrMapOvr>
+    <a:masterClrMapping/>
+  </p:clrMapOvr>
+</p:sld>
+</file>
+
+<file path=ppt/slides/slide8.xml><?xml version="1.0" encoding="utf-8"?>
+<p:sld xmlns:a="http://schemas.openxmlformats.org/drawingml/2006/main" xmlns:r="http://schemas.openxmlformats.org/officeDocument/2006/relationships" xmlns:p="http://schemas.openxmlformats.org/presentationml/2006/main">
+  <p:cSld>
+    <p:spTree>
+      <p:nvGrpSpPr>
+        <p:cNvPr id="1" name=""/>
+        <p:cNvGrpSpPr/>
+        <p:nvPr/>
+      </p:nvGrpSpPr>
+      <p:grpSpPr>
+        <a:xfrm>
+          <a:off x="0" y="0"/>
+          <a:ext cx="0" cy="0"/>
+          <a:chOff x="0" y="0"/>
+          <a:chExt cx="0" cy="0"/>
+        </a:xfrm>
+      </p:grpSpPr>
+      <p:sp>
+        <p:nvSpPr>
           <p:cNvPr id="2" name="Title 1">
             <a:extLst>
               <a:ext uri="{FF2B5EF4-FFF2-40B4-BE49-F238E27FC236}">
@@ -10305,12 +10968,23 @@
             <p:ph type="title"/>
           </p:nvPr>
         </p:nvSpPr>
-        <p:spPr/>
+        <p:spPr>
+          <a:xfrm>
+            <a:off x="496925" y="1095855"/>
+            <a:ext cx="8415900" cy="907911"/>
+          </a:xfrm>
+        </p:spPr>
         <p:txBody>
           <a:bodyPr/>
           <a:lstStyle/>
           <a:p>
-            <a:endParaRPr lang="en-US"/>
+            <a:pPr algn="ctr">
+              <a:buNone/>
+            </a:pPr>
+            <a:r>
+              <a:rPr lang="en-US" dirty="0"/>
+              <a:t>Questions &amp; Discussion</a:t>
+            </a:r>
           </a:p>
         </p:txBody>
       </p:sp>
@@ -10346,12 +11020,42 @@
             </a:pPr>
             <a:fld id="{00000000-1234-1234-1234-123412341234}" type="slidenum">
               <a:rPr lang="en" smtClean="0"/>
-              <a:t>5</a:t>
+              <a:t>8</a:t>
             </a:fld>
             <a:endParaRPr lang="en"/>
           </a:p>
         </p:txBody>
       </p:sp>
+      <p:pic>
+        <p:nvPicPr>
+          <p:cNvPr id="5" name="Picture 4">
+            <a:extLst>
+              <a:ext uri="{FF2B5EF4-FFF2-40B4-BE49-F238E27FC236}">
+                <a16:creationId xmlns:a16="http://schemas.microsoft.com/office/drawing/2014/main" id="{B0B50E4D-EC9D-9D25-2318-D95D4D254D6A}"/>
+              </a:ext>
+            </a:extLst>
+          </p:cNvPr>
+          <p:cNvPicPr>
+            <a:picLocks noChangeAspect="1"/>
+          </p:cNvPicPr>
+          <p:nvPr/>
+        </p:nvPicPr>
+        <p:blipFill>
+          <a:blip r:embed="rId2"/>
+          <a:stretch>
+            <a:fillRect/>
+          </a:stretch>
+        </p:blipFill>
+        <p:spPr>
+          <a:xfrm>
+            <a:off x="3537981" y="1979607"/>
+            <a:ext cx="2068038" cy="2068038"/>
+          </a:xfrm>
+          <a:prstGeom prst="rect">
+            <a:avLst/>
+          </a:prstGeom>
+        </p:spPr>
+      </p:pic>
     </p:spTree>
     <p:extLst>
       <p:ext uri="{BB962C8B-B14F-4D97-AF65-F5344CB8AC3E}">

</xml_diff>

<commit_message>
Final(?) obsessive presentation changes & better pdfs
</commit_message>
<xml_diff>
--- a/Presentation/Finnegan_Sr_Mgr_Learner_Eval&Analytics_Thought_Exercise.pptx
+++ b/Presentation/Finnegan_Sr_Mgr_Learner_Eval&Analytics_Thought_Exercise.pptx
@@ -5,17 +5,18 @@
     <p:sldMasterId id="2147483660" r:id="rId1"/>
   </p:sldMasterIdLst>
   <p:notesMasterIdLst>
-    <p:notesMasterId r:id="rId10"/>
+    <p:notesMasterId r:id="rId11"/>
   </p:notesMasterIdLst>
   <p:sldIdLst>
     <p:sldId id="256" r:id="rId2"/>
     <p:sldId id="257" r:id="rId3"/>
-    <p:sldId id="259" r:id="rId4"/>
-    <p:sldId id="260" r:id="rId5"/>
-    <p:sldId id="261" r:id="rId6"/>
-    <p:sldId id="262" r:id="rId7"/>
-    <p:sldId id="263" r:id="rId8"/>
-    <p:sldId id="258" r:id="rId9"/>
+    <p:sldId id="264" r:id="rId4"/>
+    <p:sldId id="259" r:id="rId5"/>
+    <p:sldId id="260" r:id="rId6"/>
+    <p:sldId id="265" r:id="rId7"/>
+    <p:sldId id="262" r:id="rId8"/>
+    <p:sldId id="263" r:id="rId9"/>
+    <p:sldId id="258" r:id="rId10"/>
   </p:sldIdLst>
   <p:sldSz cx="9144000" cy="5143500" type="screen16x9"/>
   <p:notesSz cx="6858000" cy="9144000"/>
@@ -800,7 +801,7 @@
               </a:spcAft>
               <a:buNone/>
             </a:pPr>
-            <a:endParaRPr/>
+            <a:endParaRPr dirty="0"/>
           </a:p>
         </p:txBody>
       </p:sp>
@@ -904,7 +905,7 @@
               </a:spcAft>
               <a:buNone/>
             </a:pPr>
-            <a:endParaRPr/>
+            <a:endParaRPr dirty="0"/>
           </a:p>
         </p:txBody>
       </p:sp>
@@ -981,7 +982,7 @@
               </a:spcAft>
               <a:buNone/>
             </a:pPr>
-            <a:endParaRPr/>
+            <a:endParaRPr dirty="0"/>
           </a:p>
         </p:txBody>
       </p:sp>
@@ -1253,7 +1254,7 @@
               </a:spcAft>
               <a:buNone/>
             </a:pPr>
-            <a:endParaRPr/>
+            <a:endParaRPr dirty="0"/>
           </a:p>
         </p:txBody>
       </p:sp>
@@ -1453,7 +1454,7 @@
               </a:spcAft>
               <a:buNone/>
             </a:pPr>
-            <a:endParaRPr/>
+            <a:endParaRPr dirty="0"/>
           </a:p>
         </p:txBody>
       </p:sp>
@@ -1499,7 +1500,7 @@
               </a:spcAft>
               <a:buNone/>
             </a:pPr>
-            <a:endParaRPr/>
+            <a:endParaRPr dirty="0"/>
           </a:p>
         </p:txBody>
       </p:sp>
@@ -1774,7 +1775,7 @@
               </a:spcAft>
               <a:buNone/>
             </a:pPr>
-            <a:endParaRPr/>
+            <a:endParaRPr dirty="0"/>
           </a:p>
         </p:txBody>
       </p:sp>
@@ -1889,7 +1890,7 @@
               <a:rPr lang="en"/>
               <a:t>‹#›</a:t>
             </a:fld>
-            <a:endParaRPr/>
+            <a:endParaRPr dirty="0"/>
           </a:p>
         </p:txBody>
       </p:sp>
@@ -2107,7 +2108,7 @@
               </a:spcAft>
               <a:buNone/>
             </a:pPr>
-            <a:endParaRPr/>
+            <a:endParaRPr dirty="0"/>
           </a:p>
         </p:txBody>
       </p:sp>
@@ -2186,7 +2187,7 @@
               <a:rPr lang="en"/>
               <a:t>‹#›</a:t>
             </a:fld>
-            <a:endParaRPr/>
+            <a:endParaRPr dirty="0"/>
           </a:p>
         </p:txBody>
       </p:sp>
@@ -2268,7 +2269,7 @@
               </a:spcAft>
               <a:buNone/>
             </a:pPr>
-            <a:endParaRPr/>
+            <a:endParaRPr dirty="0"/>
           </a:p>
         </p:txBody>
       </p:sp>
@@ -2347,7 +2348,7 @@
               <a:rPr lang="en"/>
               <a:t>‹#›</a:t>
             </a:fld>
-            <a:endParaRPr/>
+            <a:endParaRPr dirty="0"/>
           </a:p>
         </p:txBody>
       </p:sp>
@@ -2594,7 +2595,7 @@
                 </a:spcAft>
                 <a:buNone/>
               </a:pPr>
-              <a:endParaRPr/>
+              <a:endParaRPr dirty="0"/>
             </a:p>
           </p:txBody>
         </p:sp>
@@ -2661,7 +2662,7 @@
                 </a:spcAft>
                 <a:buNone/>
               </a:pPr>
-              <a:endParaRPr/>
+              <a:endParaRPr dirty="0"/>
             </a:p>
           </p:txBody>
         </p:sp>
@@ -2721,7 +2722,7 @@
                 </a:spcAft>
                 <a:buNone/>
               </a:pPr>
-              <a:endParaRPr/>
+              <a:endParaRPr dirty="0"/>
             </a:p>
           </p:txBody>
         </p:sp>
@@ -2781,7 +2782,7 @@
                 </a:spcAft>
                 <a:buNone/>
               </a:pPr>
-              <a:endParaRPr/>
+              <a:endParaRPr dirty="0"/>
             </a:p>
           </p:txBody>
         </p:sp>
@@ -2841,7 +2842,7 @@
                 </a:spcAft>
                 <a:buNone/>
               </a:pPr>
-              <a:endParaRPr/>
+              <a:endParaRPr dirty="0"/>
             </a:p>
           </p:txBody>
         </p:sp>
@@ -2899,7 +2900,7 @@
               </a:spcAft>
               <a:buNone/>
             </a:pPr>
-            <a:endParaRPr/>
+            <a:endParaRPr dirty="0"/>
           </a:p>
         </p:txBody>
       </p:sp>
@@ -2978,7 +2979,7 @@
               <a:rPr lang="en"/>
               <a:t>‹#›</a:t>
             </a:fld>
-            <a:endParaRPr/>
+            <a:endParaRPr dirty="0"/>
           </a:p>
         </p:txBody>
       </p:sp>
@@ -3049,7 +3050,7 @@
               </a:spcAft>
               <a:buNone/>
             </a:pPr>
-            <a:endParaRPr>
+            <a:endParaRPr dirty="0">
               <a:solidFill>
                 <a:srgbClr val="285293"/>
               </a:solidFill>
@@ -3091,7 +3092,7 @@
               </a:spcAft>
               <a:buNone/>
             </a:pPr>
-            <a:endParaRPr/>
+            <a:endParaRPr dirty="0"/>
           </a:p>
         </p:txBody>
       </p:sp>
@@ -3333,7 +3334,7 @@
               </a:rPr>
               <a:t>Objectives</a:t>
             </a:r>
-            <a:endParaRPr sz="4000">
+            <a:endParaRPr sz="4000" dirty="0">
               <a:solidFill>
                 <a:schemeClr val="lt1"/>
               </a:solidFill>
@@ -3420,7 +3421,7 @@
               <a:rPr lang="en"/>
               <a:t>‹#›</a:t>
             </a:fld>
-            <a:endParaRPr/>
+            <a:endParaRPr dirty="0"/>
           </a:p>
         </p:txBody>
       </p:sp>
@@ -3818,7 +3819,7 @@
               </a:spcAft>
               <a:buNone/>
             </a:pPr>
-            <a:endParaRPr/>
+            <a:endParaRPr dirty="0"/>
           </a:p>
         </p:txBody>
       </p:sp>
@@ -3897,7 +3898,7 @@
               <a:rPr lang="en"/>
               <a:t>‹#›</a:t>
             </a:fld>
-            <a:endParaRPr/>
+            <a:endParaRPr dirty="0"/>
           </a:p>
         </p:txBody>
       </p:sp>
@@ -4271,7 +4272,7 @@
               </a:spcAft>
               <a:buNone/>
             </a:pPr>
-            <a:endParaRPr/>
+            <a:endParaRPr dirty="0"/>
           </a:p>
         </p:txBody>
       </p:sp>
@@ -4350,7 +4351,7 @@
               <a:rPr lang="en"/>
               <a:t>‹#›</a:t>
             </a:fld>
-            <a:endParaRPr/>
+            <a:endParaRPr dirty="0"/>
           </a:p>
         </p:txBody>
       </p:sp>
@@ -4568,7 +4569,7 @@
               </a:spcAft>
               <a:buNone/>
             </a:pPr>
-            <a:endParaRPr/>
+            <a:endParaRPr dirty="0"/>
           </a:p>
         </p:txBody>
       </p:sp>
@@ -4770,7 +4771,7 @@
               </a:spcAft>
               <a:buNone/>
             </a:pPr>
-            <a:endParaRPr/>
+            <a:endParaRPr dirty="0"/>
           </a:p>
         </p:txBody>
       </p:sp>
@@ -4985,7 +4986,7 @@
               <a:rPr lang="en"/>
               <a:t>‹#›</a:t>
             </a:fld>
-            <a:endParaRPr/>
+            <a:endParaRPr dirty="0"/>
           </a:p>
         </p:txBody>
       </p:sp>
@@ -5359,7 +5360,7 @@
               </a:spcAft>
               <a:buNone/>
             </a:pPr>
-            <a:endParaRPr/>
+            <a:endParaRPr dirty="0"/>
           </a:p>
         </p:txBody>
       </p:sp>
@@ -5438,7 +5439,7 @@
               <a:rPr lang="en"/>
               <a:t>‹#›</a:t>
             </a:fld>
-            <a:endParaRPr/>
+            <a:endParaRPr dirty="0"/>
           </a:p>
         </p:txBody>
       </p:sp>
@@ -5914,7 +5915,7 @@
               </a:spcAft>
               <a:buNone/>
             </a:pPr>
-            <a:endParaRPr/>
+            <a:endParaRPr dirty="0"/>
           </a:p>
         </p:txBody>
       </p:sp>
@@ -5993,7 +5994,7 @@
               <a:rPr lang="en"/>
               <a:t>‹#›</a:t>
             </a:fld>
-            <a:endParaRPr/>
+            <a:endParaRPr dirty="0"/>
           </a:p>
         </p:txBody>
       </p:sp>
@@ -6211,7 +6212,7 @@
               </a:spcAft>
               <a:buNone/>
             </a:pPr>
-            <a:endParaRPr/>
+            <a:endParaRPr dirty="0"/>
           </a:p>
         </p:txBody>
       </p:sp>
@@ -6290,7 +6291,7 @@
               <a:rPr lang="en"/>
               <a:t>‹#›</a:t>
             </a:fld>
-            <a:endParaRPr/>
+            <a:endParaRPr dirty="0"/>
           </a:p>
         </p:txBody>
       </p:sp>
@@ -6806,7 +6807,7 @@
                 </a:spcAft>
                 <a:buNone/>
               </a:pPr>
-              <a:endParaRPr/>
+              <a:endParaRPr dirty="0"/>
             </a:p>
           </p:txBody>
         </p:sp>
@@ -6872,7 +6873,7 @@
                 </a:spcAft>
                 <a:buNone/>
               </a:pPr>
-              <a:endParaRPr/>
+              <a:endParaRPr dirty="0"/>
             </a:p>
           </p:txBody>
         </p:sp>
@@ -6950,7 +6951,7 @@
                 </a:spcAft>
                 <a:buNone/>
               </a:pPr>
-              <a:endParaRPr/>
+              <a:endParaRPr dirty="0"/>
             </a:p>
           </p:txBody>
         </p:sp>
@@ -7013,7 +7014,7 @@
                 </a:spcAft>
                 <a:buNone/>
               </a:pPr>
-              <a:endParaRPr/>
+              <a:endParaRPr dirty="0"/>
             </a:p>
           </p:txBody>
         </p:sp>
@@ -7091,7 +7092,7 @@
                 </a:spcAft>
                 <a:buNone/>
               </a:pPr>
-              <a:endParaRPr/>
+              <a:endParaRPr dirty="0"/>
             </a:p>
           </p:txBody>
         </p:sp>
@@ -7151,7 +7152,7 @@
                 </a:spcAft>
                 <a:buNone/>
               </a:pPr>
-              <a:endParaRPr/>
+              <a:endParaRPr dirty="0"/>
             </a:p>
           </p:txBody>
         </p:sp>
@@ -7229,7 +7230,7 @@
                 </a:spcAft>
                 <a:buNone/>
               </a:pPr>
-              <a:endParaRPr/>
+              <a:endParaRPr dirty="0"/>
             </a:p>
           </p:txBody>
         </p:sp>
@@ -7298,7 +7299,7 @@
                 </a:spcAft>
                 <a:buNone/>
               </a:pPr>
-              <a:endParaRPr/>
+              <a:endParaRPr dirty="0"/>
             </a:p>
           </p:txBody>
         </p:sp>
@@ -7376,7 +7377,7 @@
                 </a:spcAft>
                 <a:buNone/>
               </a:pPr>
-              <a:endParaRPr/>
+              <a:endParaRPr dirty="0"/>
             </a:p>
           </p:txBody>
         </p:sp>
@@ -7436,7 +7437,7 @@
                 </a:spcAft>
                 <a:buNone/>
               </a:pPr>
-              <a:endParaRPr/>
+              <a:endParaRPr dirty="0"/>
             </a:p>
           </p:txBody>
         </p:sp>
@@ -7514,7 +7515,7 @@
                 </a:spcAft>
                 <a:buNone/>
               </a:pPr>
-              <a:endParaRPr/>
+              <a:endParaRPr dirty="0"/>
             </a:p>
           </p:txBody>
         </p:sp>
@@ -7592,7 +7593,7 @@
                 </a:spcAft>
                 <a:buNone/>
               </a:pPr>
-              <a:endParaRPr/>
+              <a:endParaRPr dirty="0"/>
             </a:p>
           </p:txBody>
         </p:sp>
@@ -7664,7 +7665,7 @@
                 </a:spcAft>
                 <a:buNone/>
               </a:pPr>
-              <a:endParaRPr/>
+              <a:endParaRPr dirty="0"/>
             </a:p>
           </p:txBody>
         </p:sp>
@@ -7757,7 +7758,7 @@
                 </a:spcAft>
                 <a:buNone/>
               </a:pPr>
-              <a:endParaRPr/>
+              <a:endParaRPr dirty="0"/>
             </a:p>
           </p:txBody>
         </p:sp>
@@ -7823,7 +7824,7 @@
                 </a:spcAft>
                 <a:buNone/>
               </a:pPr>
-              <a:endParaRPr/>
+              <a:endParaRPr dirty="0"/>
             </a:p>
           </p:txBody>
         </p:sp>
@@ -7901,7 +7902,7 @@
                 </a:spcAft>
                 <a:buNone/>
               </a:pPr>
-              <a:endParaRPr/>
+              <a:endParaRPr dirty="0"/>
             </a:p>
           </p:txBody>
         </p:sp>
@@ -7964,7 +7965,7 @@
                 </a:spcAft>
                 <a:buNone/>
               </a:pPr>
-              <a:endParaRPr/>
+              <a:endParaRPr dirty="0"/>
             </a:p>
           </p:txBody>
         </p:sp>
@@ -8042,7 +8043,7 @@
                 </a:spcAft>
                 <a:buNone/>
               </a:pPr>
-              <a:endParaRPr/>
+              <a:endParaRPr dirty="0"/>
             </a:p>
           </p:txBody>
         </p:sp>
@@ -8102,7 +8103,7 @@
                 </a:spcAft>
                 <a:buNone/>
               </a:pPr>
-              <a:endParaRPr/>
+              <a:endParaRPr dirty="0"/>
             </a:p>
           </p:txBody>
         </p:sp>
@@ -8180,7 +8181,7 @@
                 </a:spcAft>
                 <a:buNone/>
               </a:pPr>
-              <a:endParaRPr/>
+              <a:endParaRPr dirty="0"/>
             </a:p>
           </p:txBody>
         </p:sp>
@@ -8249,7 +8250,7 @@
                 </a:spcAft>
                 <a:buNone/>
               </a:pPr>
-              <a:endParaRPr/>
+              <a:endParaRPr dirty="0"/>
             </a:p>
           </p:txBody>
         </p:sp>
@@ -8327,7 +8328,7 @@
                 </a:spcAft>
                 <a:buNone/>
               </a:pPr>
-              <a:endParaRPr/>
+              <a:endParaRPr dirty="0"/>
             </a:p>
           </p:txBody>
         </p:sp>
@@ -8387,7 +8388,7 @@
                 </a:spcAft>
                 <a:buNone/>
               </a:pPr>
-              <a:endParaRPr/>
+              <a:endParaRPr dirty="0"/>
             </a:p>
           </p:txBody>
         </p:sp>
@@ -8465,7 +8466,7 @@
                 </a:spcAft>
                 <a:buNone/>
               </a:pPr>
-              <a:endParaRPr/>
+              <a:endParaRPr dirty="0"/>
             </a:p>
           </p:txBody>
         </p:sp>
@@ -8543,7 +8544,7 @@
                 </a:spcAft>
                 <a:buNone/>
               </a:pPr>
-              <a:endParaRPr/>
+              <a:endParaRPr dirty="0"/>
             </a:p>
           </p:txBody>
         </p:sp>
@@ -8615,7 +8616,7 @@
                 </a:spcAft>
                 <a:buNone/>
               </a:pPr>
-              <a:endParaRPr/>
+              <a:endParaRPr dirty="0"/>
             </a:p>
           </p:txBody>
         </p:sp>
@@ -8735,7 +8736,7 @@
               <a:rPr lang="en"/>
               <a:t>‹#›</a:t>
             </a:fld>
-            <a:endParaRPr/>
+            <a:endParaRPr dirty="0"/>
           </a:p>
         </p:txBody>
       </p:sp>
@@ -9466,6 +9467,57 @@
           <a:chExt cx="0" cy="0"/>
         </a:xfrm>
       </p:grpSpPr>
+      <p:pic>
+        <p:nvPicPr>
+          <p:cNvPr id="3" name="Picture 2">
+            <a:extLst>
+              <a:ext uri="{FF2B5EF4-FFF2-40B4-BE49-F238E27FC236}">
+                <a16:creationId xmlns:a16="http://schemas.microsoft.com/office/drawing/2014/main" id="{995CF836-373F-1269-E0F0-9350C2E65E96}"/>
+              </a:ext>
+            </a:extLst>
+          </p:cNvPr>
+          <p:cNvPicPr>
+            <a:picLocks noChangeAspect="1"/>
+          </p:cNvPicPr>
+          <p:nvPr/>
+        </p:nvPicPr>
+        <p:blipFill rotWithShape="1">
+          <a:blip r:embed="rId3">
+            <a:duotone>
+              <a:schemeClr val="accent1">
+                <a:shade val="45000"/>
+                <a:satMod val="135000"/>
+              </a:schemeClr>
+              <a:prstClr val="white"/>
+            </a:duotone>
+            <a:extLst>
+              <a:ext uri="{BEBA8EAE-BF5A-486C-A8C5-ECC9F3942E4B}">
+                <a14:imgProps xmlns:a14="http://schemas.microsoft.com/office/drawing/2010/main">
+                  <a14:imgLayer r:embed="rId4">
+                    <a14:imgEffect>
+                      <a14:saturation sat="81000"/>
+                    </a14:imgEffect>
+                    <a14:imgEffect>
+                      <a14:brightnessContrast bright="-12000"/>
+                    </a14:imgEffect>
+                  </a14:imgLayer>
+                </a14:imgProps>
+              </a:ext>
+            </a:extLst>
+          </a:blip>
+          <a:srcRect t="-1210" b="5376"/>
+          <a:stretch/>
+        </p:blipFill>
+        <p:spPr>
+          <a:xfrm>
+            <a:off x="268430" y="1568334"/>
+            <a:ext cx="2235708" cy="2103120"/>
+          </a:xfrm>
+          <a:prstGeom prst="rect">
+            <a:avLst/>
+          </a:prstGeom>
+        </p:spPr>
+      </p:pic>
       <p:sp>
         <p:nvSpPr>
           <p:cNvPr id="110" name="Google Shape;110;p14"/>
@@ -9478,7 +9530,7 @@
         </p:nvSpPr>
         <p:spPr>
           <a:xfrm>
-            <a:off x="0" y="2080377"/>
+            <a:off x="387926" y="1560438"/>
             <a:ext cx="9144000" cy="1438200"/>
           </a:xfrm>
           <a:prstGeom prst="rect">
@@ -9501,14 +9553,21 @@
               <a:buNone/>
             </a:pPr>
             <a:r>
-              <a:rPr lang="en-US" sz="3200" dirty="0"/>
-              <a:t>Senior Manager, Learner Evaluation &amp; Analytics</a:t>
+              <a:rPr lang="en-US" sz="2800" dirty="0"/>
+              <a:t>Senior Manager, </a:t>
             </a:r>
             <a:br>
-              <a:rPr lang="en-US" sz="3200" dirty="0"/>
+              <a:rPr lang="en-US" sz="2800" dirty="0"/>
             </a:br>
             <a:r>
-              <a:rPr lang="en-US" sz="3200" dirty="0"/>
+              <a:rPr lang="en-US" sz="2800" dirty="0"/>
+              <a:t>Learner Evaluation &amp; Analytics</a:t>
+            </a:r>
+            <a:br>
+              <a:rPr lang="en-US" sz="2800" dirty="0"/>
+            </a:br>
+            <a:r>
+              <a:rPr lang="en-US" sz="2800" dirty="0"/>
               <a:t>Thought Exercise Presentation</a:t>
             </a:r>
             <a:br>
@@ -9597,7 +9656,12 @@
             <p:ph type="body" idx="1"/>
           </p:nvPr>
         </p:nvSpPr>
-        <p:spPr/>
+        <p:spPr>
+          <a:xfrm>
+            <a:off x="434450" y="1434680"/>
+            <a:ext cx="8520600" cy="2666265"/>
+          </a:xfrm>
+        </p:spPr>
         <p:txBody>
           <a:bodyPr>
             <a:normAutofit/>
@@ -9674,7 +9738,7 @@
               <a:rPr lang="en"/>
               <a:t>2</a:t>
             </a:fld>
-            <a:endParaRPr/>
+            <a:endParaRPr dirty="0"/>
           </a:p>
         </p:txBody>
       </p:sp>
@@ -9687,6 +9751,194 @@
 </file>
 
 <file path=ppt/slides/slide3.xml><?xml version="1.0" encoding="utf-8"?>
+<p:sld xmlns:a="http://schemas.openxmlformats.org/drawingml/2006/main" xmlns:r="http://schemas.openxmlformats.org/officeDocument/2006/relationships" xmlns:p="http://schemas.openxmlformats.org/presentationml/2006/main">
+  <p:cSld>
+    <p:spTree>
+      <p:nvGrpSpPr>
+        <p:cNvPr id="1" name=""/>
+        <p:cNvGrpSpPr/>
+        <p:nvPr/>
+      </p:nvGrpSpPr>
+      <p:grpSpPr>
+        <a:xfrm>
+          <a:off x="0" y="0"/>
+          <a:ext cx="0" cy="0"/>
+          <a:chOff x="0" y="0"/>
+          <a:chExt cx="0" cy="0"/>
+        </a:xfrm>
+      </p:grpSpPr>
+      <p:sp>
+        <p:nvSpPr>
+          <p:cNvPr id="6" name="Title 5">
+            <a:extLst>
+              <a:ext uri="{FF2B5EF4-FFF2-40B4-BE49-F238E27FC236}">
+                <a16:creationId xmlns:a16="http://schemas.microsoft.com/office/drawing/2014/main" id="{66EFDF78-CFD1-111C-F2EC-329C725534CB}"/>
+              </a:ext>
+            </a:extLst>
+          </p:cNvPr>
+          <p:cNvSpPr>
+            <a:spLocks noGrp="1"/>
+          </p:cNvSpPr>
+          <p:nvPr>
+            <p:ph type="title"/>
+          </p:nvPr>
+        </p:nvSpPr>
+        <p:spPr/>
+        <p:txBody>
+          <a:bodyPr/>
+          <a:lstStyle/>
+          <a:p>
+            <a:pPr>
+              <a:buNone/>
+            </a:pPr>
+            <a:r>
+              <a:rPr lang="en-US" dirty="0"/>
+              <a:t>Basic Approach and Assumptions</a:t>
+            </a:r>
+          </a:p>
+        </p:txBody>
+      </p:sp>
+      <p:sp>
+        <p:nvSpPr>
+          <p:cNvPr id="7" name="Text Placeholder 6">
+            <a:extLst>
+              <a:ext uri="{FF2B5EF4-FFF2-40B4-BE49-F238E27FC236}">
+                <a16:creationId xmlns:a16="http://schemas.microsoft.com/office/drawing/2014/main" id="{7598407A-CD7F-ABE5-A466-F804535E1916}"/>
+              </a:ext>
+            </a:extLst>
+          </p:cNvPr>
+          <p:cNvSpPr>
+            <a:spLocks noGrp="1"/>
+          </p:cNvSpPr>
+          <p:nvPr>
+            <p:ph type="body" idx="1"/>
+          </p:nvPr>
+        </p:nvSpPr>
+        <p:spPr/>
+        <p:txBody>
+          <a:bodyPr/>
+          <a:lstStyle/>
+          <a:p>
+            <a:pPr marL="0" indent="0">
+              <a:buNone/>
+            </a:pPr>
+            <a:r>
+              <a:rPr lang="en-US" b="1" u="sng" dirty="0"/>
+              <a:t>Philosophy</a:t>
+            </a:r>
+          </a:p>
+          <a:p>
+            <a:r>
+              <a:rPr lang="en-US" sz="1600" dirty="0"/>
+              <a:t>Plan to spend </a:t>
+            </a:r>
+            <a:r>
+              <a:rPr lang="en-US" sz="1600" i="1" dirty="0"/>
+              <a:t>at least </a:t>
+            </a:r>
+            <a:r>
+              <a:rPr lang="en-US" sz="1600" dirty="0"/>
+              <a:t>twice as long on cleaning &amp; munging as you want/expect to, and more time than on anything else</a:t>
+            </a:r>
+          </a:p>
+          <a:p>
+            <a:r>
+              <a:rPr lang="en-US" sz="1600" dirty="0"/>
+              <a:t>80/20 rule: 20% most basic analysis gives you 80% of your insight</a:t>
+            </a:r>
+            <a:br>
+              <a:rPr lang="en-US" sz="1600" dirty="0"/>
+            </a:br>
+            <a:endParaRPr lang="en-US" sz="1600" dirty="0"/>
+          </a:p>
+          <a:p>
+            <a:pPr marL="0" indent="0">
+              <a:buNone/>
+            </a:pPr>
+            <a:r>
+              <a:rPr lang="en-US" b="1" u="sng" dirty="0"/>
+              <a:t>Assumptions</a:t>
+            </a:r>
+          </a:p>
+          <a:p>
+            <a:r>
+              <a:rPr lang="en-US" sz="1600" dirty="0"/>
+              <a:t>Per Scholas team’s time is valuable &amp; data are either sample or archival</a:t>
+            </a:r>
+          </a:p>
+          <a:p>
+            <a:r>
+              <a:rPr lang="en-US" dirty="0"/>
+              <a:t>Therefore, n</a:t>
+            </a:r>
+            <a:r>
+              <a:rPr lang="en-US" sz="1600" dirty="0"/>
+              <a:t>o emails, no pestering: forensics, not discovery</a:t>
+            </a:r>
+          </a:p>
+          <a:p>
+            <a:r>
+              <a:rPr lang="en-US" sz="1600" dirty="0"/>
+              <a:t>[Exactly the opposite of real best practice]</a:t>
+            </a:r>
+          </a:p>
+          <a:p>
+            <a:endParaRPr lang="en-US" dirty="0"/>
+          </a:p>
+        </p:txBody>
+      </p:sp>
+      <p:sp>
+        <p:nvSpPr>
+          <p:cNvPr id="5" name="Slide Number Placeholder 4">
+            <a:extLst>
+              <a:ext uri="{FF2B5EF4-FFF2-40B4-BE49-F238E27FC236}">
+                <a16:creationId xmlns:a16="http://schemas.microsoft.com/office/drawing/2014/main" id="{305F1264-83B6-1ED1-1D46-D9A4D60B08AF}"/>
+              </a:ext>
+            </a:extLst>
+          </p:cNvPr>
+          <p:cNvSpPr>
+            <a:spLocks noGrp="1"/>
+          </p:cNvSpPr>
+          <p:nvPr>
+            <p:ph type="sldNum" idx="12"/>
+          </p:nvPr>
+        </p:nvSpPr>
+        <p:spPr/>
+        <p:txBody>
+          <a:bodyPr/>
+          <a:lstStyle/>
+          <a:p>
+            <a:pPr marL="0" lvl="0" indent="0" algn="r" rtl="0">
+              <a:spcBef>
+                <a:spcPts val="0"/>
+              </a:spcBef>
+              <a:spcAft>
+                <a:spcPts val="0"/>
+              </a:spcAft>
+              <a:buNone/>
+            </a:pPr>
+            <a:fld id="{00000000-1234-1234-1234-123412341234}" type="slidenum">
+              <a:rPr lang="en" smtClean="0"/>
+              <a:t>3</a:t>
+            </a:fld>
+            <a:endParaRPr lang="en"/>
+          </a:p>
+        </p:txBody>
+      </p:sp>
+    </p:spTree>
+    <p:extLst>
+      <p:ext uri="{BB962C8B-B14F-4D97-AF65-F5344CB8AC3E}">
+        <p14:creationId xmlns:p14="http://schemas.microsoft.com/office/powerpoint/2010/main" val="2032859738"/>
+      </p:ext>
+    </p:extLst>
+  </p:cSld>
+  <p:clrMapOvr>
+    <a:masterClrMapping/>
+  </p:clrMapOvr>
+</p:sld>
+</file>
+
+<file path=ppt/slides/slide4.xml><?xml version="1.0" encoding="utf-8"?>
 <p:sld xmlns:a="http://schemas.openxmlformats.org/drawingml/2006/main" xmlns:r="http://schemas.openxmlformats.org/officeDocument/2006/relationships" xmlns:p="http://schemas.openxmlformats.org/presentationml/2006/main">
   <p:cSld>
     <p:spTree>
@@ -9721,21 +9973,16 @@
         </p:nvSpPr>
         <p:spPr>
           <a:xfrm>
-            <a:off x="311699" y="1496000"/>
-            <a:ext cx="3999900" cy="2355159"/>
+            <a:off x="422534" y="1454898"/>
+            <a:ext cx="8038041" cy="2972550"/>
           </a:xfrm>
           <a:ln>
-            <a:solidFill>
-              <a:schemeClr val="tx1">
-                <a:lumMod val="60000"/>
-                <a:lumOff val="40000"/>
-              </a:schemeClr>
-            </a:solidFill>
+            <a:noFill/>
           </a:ln>
         </p:spPr>
         <p:txBody>
           <a:bodyPr>
-            <a:normAutofit fontScale="92500" lnSpcReduction="10000"/>
+            <a:normAutofit/>
           </a:bodyPr>
           <a:lstStyle/>
           <a:p>
@@ -9772,123 +10019,13 @@
             </a:r>
           </a:p>
           <a:p>
+            <a:pPr marL="139700" indent="0">
+              <a:buNone/>
+            </a:pPr>
+            <a:br>
+              <a:rPr lang="en-US" b="1" u="sng" dirty="0"/>
+            </a:br>
             <a:endParaRPr lang="en-US" dirty="0"/>
-          </a:p>
-          <a:p>
-            <a:pPr marL="139700" indent="0">
-              <a:buNone/>
-            </a:pPr>
-            <a:r>
-              <a:rPr lang="en-US" b="1" u="sng" dirty="0"/>
-              <a:t>Tools</a:t>
-            </a:r>
-          </a:p>
-          <a:p>
-            <a:r>
-              <a:rPr lang="en-US" dirty="0"/>
-              <a:t>Excel </a:t>
-            </a:r>
-            <a:r>
-              <a:rPr lang="en-US" dirty="0">
-                <a:sym typeface="Wingdings" panose="05000000000000000000" pitchFamily="2" charset="2"/>
-              </a:rPr>
-              <a:t> Python  Tableau  Python, R</a:t>
-            </a:r>
-          </a:p>
-          <a:p>
-            <a:r>
-              <a:rPr lang="en-US" dirty="0">
-                <a:sym typeface="Wingdings" panose="05000000000000000000" pitchFamily="2" charset="2"/>
-              </a:rPr>
-              <a:t>Clean  Prep  Explore, Viz  Analyze, Viz &amp; Evaluate</a:t>
-            </a:r>
-            <a:endParaRPr lang="en-US" dirty="0"/>
-          </a:p>
-        </p:txBody>
-      </p:sp>
-      <p:sp>
-        <p:nvSpPr>
-          <p:cNvPr id="13" name="Text Placeholder 12">
-            <a:extLst>
-              <a:ext uri="{FF2B5EF4-FFF2-40B4-BE49-F238E27FC236}">
-                <a16:creationId xmlns:a16="http://schemas.microsoft.com/office/drawing/2014/main" id="{2B1D6D4B-C908-740F-40C7-4E60615F55E2}"/>
-              </a:ext>
-            </a:extLst>
-          </p:cNvPr>
-          <p:cNvSpPr>
-            <a:spLocks noGrp="1"/>
-          </p:cNvSpPr>
-          <p:nvPr>
-            <p:ph type="body" idx="2"/>
-          </p:nvPr>
-        </p:nvSpPr>
-        <p:spPr>
-          <a:xfrm>
-            <a:off x="4745659" y="1496000"/>
-            <a:ext cx="4260516" cy="2355159"/>
-          </a:xfrm>
-          <a:noFill/>
-          <a:ln>
-            <a:solidFill>
-              <a:schemeClr val="tx1">
-                <a:lumMod val="60000"/>
-                <a:lumOff val="40000"/>
-              </a:schemeClr>
-            </a:solidFill>
-          </a:ln>
-        </p:spPr>
-        <p:txBody>
-          <a:bodyPr spcFirstLastPara="1" wrap="square" lIns="91425" tIns="91425" rIns="91425" bIns="91425" anchor="t" anchorCtr="0">
-            <a:normAutofit/>
-          </a:bodyPr>
-          <a:lstStyle/>
-          <a:p>
-            <a:pPr marL="139700" indent="0">
-              <a:buNone/>
-            </a:pPr>
-            <a:r>
-              <a:rPr lang="en-US" b="1" u="sng" dirty="0"/>
-              <a:t>Approach &amp; Philosophy</a:t>
-            </a:r>
-          </a:p>
-          <a:p>
-            <a:r>
-              <a:rPr lang="en-US" sz="1300" dirty="0"/>
-              <a:t>Plan to spend twice+ as long on cleaning as you want / expect to</a:t>
-            </a:r>
-          </a:p>
-          <a:p>
-            <a:r>
-              <a:rPr lang="en-US" sz="1300" dirty="0"/>
-              <a:t>80/20 rule: simple gets you 80% of payout</a:t>
-            </a:r>
-          </a:p>
-          <a:p>
-            <a:pPr marL="139700" indent="0">
-              <a:buNone/>
-            </a:pPr>
-            <a:r>
-              <a:rPr lang="en-US" b="1" u="sng" dirty="0"/>
-              <a:t>Assumptions</a:t>
-            </a:r>
-          </a:p>
-          <a:p>
-            <a:r>
-              <a:rPr lang="en-US" sz="1300" dirty="0"/>
-              <a:t>Your time is precious, so I took data as given</a:t>
-            </a:r>
-          </a:p>
-          <a:p>
-            <a:r>
-              <a:rPr lang="en-US" sz="1300" dirty="0"/>
-              <a:t>Forensics, not discovery</a:t>
-            </a:r>
-          </a:p>
-          <a:p>
-            <a:r>
-              <a:rPr lang="en-US" sz="1300" dirty="0"/>
-              <a:t>[Exactly the opposite of real practice]</a:t>
-            </a:r>
           </a:p>
         </p:txBody>
       </p:sp>
@@ -9918,7 +10055,7 @@
             </a:pPr>
             <a:r>
               <a:rPr lang="en-US" dirty="0"/>
-              <a:t>Outline of Method &amp; Approach</a:t>
+              <a:t>Outline of Methodology</a:t>
             </a:r>
           </a:p>
         </p:txBody>
@@ -9955,7 +10092,7 @@
             </a:pPr>
             <a:fld id="{00000000-1234-1234-1234-123412341234}" type="slidenum">
               <a:rPr lang="en" smtClean="0"/>
-              <a:t>3</a:t>
+              <a:t>4</a:t>
             </a:fld>
             <a:endParaRPr lang="en"/>
           </a:p>
@@ -9975,7 +10112,7 @@
         </p:nvSpPr>
         <p:spPr>
           <a:xfrm>
-            <a:off x="2556509" y="1828802"/>
+            <a:off x="2611925" y="1743199"/>
             <a:ext cx="387928" cy="1023050"/>
           </a:xfrm>
           <a:prstGeom prst="rightBrace">
@@ -10002,7 +10139,7 @@
           <a:lstStyle/>
           <a:p>
             <a:pPr algn="ctr"/>
-            <a:endParaRPr lang="en-US"/>
+            <a:endParaRPr lang="en-US" dirty="0"/>
           </a:p>
         </p:txBody>
       </p:sp>
@@ -10020,8 +10157,8 @@
         </p:nvSpPr>
         <p:spPr>
           <a:xfrm>
-            <a:off x="2979071" y="1984846"/>
-            <a:ext cx="1367163" cy="738664"/>
+            <a:off x="3054400" y="1993114"/>
+            <a:ext cx="2774307" cy="523220"/>
           </a:xfrm>
           <a:prstGeom prst="rect">
             <a:avLst/>
@@ -10036,23 +10173,617 @@
           <a:p>
             <a:r>
               <a:rPr lang="en-US" dirty="0"/>
-              <a:t>Seek insight,</a:t>
+              <a:t>Seek insight, ask questions, and</a:t>
             </a:r>
           </a:p>
           <a:p>
             <a:r>
               <a:rPr lang="en-US" dirty="0"/>
-              <a:t>Ask questions,</a:t>
-            </a:r>
-          </a:p>
-          <a:p>
-            <a:r>
-              <a:rPr lang="en-US" dirty="0"/>
-              <a:t>Iterate</a:t>
+              <a:t>iterate every step of the way</a:t>
             </a:r>
           </a:p>
         </p:txBody>
       </p:sp>
+      <p:graphicFrame>
+        <p:nvGraphicFramePr>
+          <p:cNvPr id="7" name="Table 6">
+            <a:extLst>
+              <a:ext uri="{FF2B5EF4-FFF2-40B4-BE49-F238E27FC236}">
+                <a16:creationId xmlns:a16="http://schemas.microsoft.com/office/drawing/2014/main" id="{71C59548-0748-6409-E4C8-1D001A39B26E}"/>
+              </a:ext>
+            </a:extLst>
+          </p:cNvPr>
+          <p:cNvGraphicFramePr>
+            <a:graphicFrameLocks noGrp="1"/>
+          </p:cNvGraphicFramePr>
+          <p:nvPr>
+            <p:extLst>
+              <p:ext uri="{D42A27DB-BD31-4B8C-83A1-F6EECF244321}">
+                <p14:modId xmlns:p14="http://schemas.microsoft.com/office/powerpoint/2010/main" val="4203352817"/>
+              </p:ext>
+            </p:extLst>
+          </p:nvPr>
+        </p:nvGraphicFramePr>
+        <p:xfrm>
+          <a:off x="651161" y="3089740"/>
+          <a:ext cx="7809414" cy="919480"/>
+        </p:xfrm>
+        <a:graphic>
+          <a:graphicData uri="http://schemas.openxmlformats.org/drawingml/2006/table">
+            <a:tbl>
+              <a:tblPr firstRow="1" bandRow="1">
+                <a:tableStyleId>{69012ECD-51FC-41F1-AA8D-1B2483CD663E}</a:tableStyleId>
+              </a:tblPr>
+              <a:tblGrid>
+                <a:gridCol w="1567534">
+                  <a:extLst>
+                    <a:ext uri="{9D8B030D-6E8A-4147-A177-3AD203B41FA5}">
+                      <a16:colId xmlns:a16="http://schemas.microsoft.com/office/drawing/2014/main" val="3303187510"/>
+                    </a:ext>
+                  </a:extLst>
+                </a:gridCol>
+                <a:gridCol w="2007717">
+                  <a:extLst>
+                    <a:ext uri="{9D8B030D-6E8A-4147-A177-3AD203B41FA5}">
+                      <a16:colId xmlns:a16="http://schemas.microsoft.com/office/drawing/2014/main" val="2329875733"/>
+                    </a:ext>
+                  </a:extLst>
+                </a:gridCol>
+                <a:gridCol w="2249796">
+                  <a:extLst>
+                    <a:ext uri="{9D8B030D-6E8A-4147-A177-3AD203B41FA5}">
+                      <a16:colId xmlns:a16="http://schemas.microsoft.com/office/drawing/2014/main" val="499814144"/>
+                    </a:ext>
+                  </a:extLst>
+                </a:gridCol>
+                <a:gridCol w="1984367">
+                  <a:extLst>
+                    <a:ext uri="{9D8B030D-6E8A-4147-A177-3AD203B41FA5}">
+                      <a16:colId xmlns:a16="http://schemas.microsoft.com/office/drawing/2014/main" val="362586416"/>
+                    </a:ext>
+                  </a:extLst>
+                </a:gridCol>
+              </a:tblGrid>
+              <a:tr h="228600">
+                <a:tc gridSpan="4">
+                  <a:txBody>
+                    <a:bodyPr/>
+                    <a:lstStyle/>
+                    <a:p>
+                      <a:r>
+                        <a:rPr lang="en-US" sz="1200" b="1" dirty="0">
+                          <a:solidFill>
+                            <a:schemeClr val="bg1">
+                              <a:lumMod val="95000"/>
+                            </a:schemeClr>
+                          </a:solidFill>
+                        </a:rPr>
+                        <a:t>Tools per Step</a:t>
+                      </a:r>
+                    </a:p>
+                  </a:txBody>
+                  <a:tcPr>
+                    <a:lnB w="12700" cap="flat" cmpd="sng" algn="ctr">
+                      <a:solidFill>
+                        <a:schemeClr val="tx1"/>
+                      </a:solidFill>
+                      <a:prstDash val="solid"/>
+                      <a:round/>
+                      <a:headEnd type="none" w="med" len="med"/>
+                      <a:tailEnd type="none" w="med" len="med"/>
+                    </a:lnB>
+                  </a:tcPr>
+                </a:tc>
+                <a:tc hMerge="1">
+                  <a:txBody>
+                    <a:bodyPr/>
+                    <a:lstStyle/>
+                    <a:p>
+                      <a:endParaRPr lang="en-US" sz="1200" b="0" dirty="0"/>
+                    </a:p>
+                  </a:txBody>
+                  <a:tcPr/>
+                </a:tc>
+                <a:tc hMerge="1">
+                  <a:txBody>
+                    <a:bodyPr/>
+                    <a:lstStyle/>
+                    <a:p>
+                      <a:endParaRPr lang="en-US" sz="1200" b="0" dirty="0"/>
+                    </a:p>
+                  </a:txBody>
+                  <a:tcPr/>
+                </a:tc>
+                <a:tc hMerge="1">
+                  <a:txBody>
+                    <a:bodyPr/>
+                    <a:lstStyle/>
+                    <a:p>
+                      <a:endParaRPr lang="en-US" sz="1200" b="0" dirty="0"/>
+                    </a:p>
+                  </a:txBody>
+                  <a:tcPr/>
+                </a:tc>
+                <a:extLst>
+                  <a:ext uri="{0D108BD9-81ED-4DB2-BD59-A6C34878D82A}">
+                    <a16:rowId xmlns:a16="http://schemas.microsoft.com/office/drawing/2014/main" val="3781824158"/>
+                  </a:ext>
+                </a:extLst>
+              </a:tr>
+              <a:tr h="239017">
+                <a:tc>
+                  <a:txBody>
+                    <a:bodyPr/>
+                    <a:lstStyle/>
+                    <a:p>
+                      <a:r>
+                        <a:rPr lang="en-US" sz="1200" b="0" u="sng" dirty="0">
+                          <a:solidFill>
+                            <a:schemeClr val="accent2"/>
+                          </a:solidFill>
+                        </a:rPr>
+                        <a:t>‘Manual’ Cleaning</a:t>
+                      </a:r>
+                    </a:p>
+                  </a:txBody>
+                  <a:tcPr>
+                    <a:lnL w="12700" cap="flat" cmpd="sng" algn="ctr">
+                      <a:solidFill>
+                        <a:schemeClr val="tx1"/>
+                      </a:solidFill>
+                      <a:prstDash val="solid"/>
+                      <a:round/>
+                      <a:headEnd type="none" w="med" len="med"/>
+                      <a:tailEnd type="none" w="med" len="med"/>
+                    </a:lnL>
+                    <a:lnR w="12700" cap="flat" cmpd="sng" algn="ctr">
+                      <a:solidFill>
+                        <a:schemeClr val="tx1"/>
+                      </a:solidFill>
+                      <a:prstDash val="solid"/>
+                      <a:round/>
+                      <a:headEnd type="none" w="med" len="med"/>
+                      <a:tailEnd type="none" w="med" len="med"/>
+                    </a:lnR>
+                    <a:lnT w="12700" cap="flat" cmpd="sng" algn="ctr">
+                      <a:solidFill>
+                        <a:schemeClr val="tx1"/>
+                      </a:solidFill>
+                      <a:prstDash val="solid"/>
+                      <a:round/>
+                      <a:headEnd type="none" w="med" len="med"/>
+                      <a:tailEnd type="none" w="med" len="med"/>
+                    </a:lnT>
+                    <a:lnB w="9525" cap="flat" cmpd="sng" algn="ctr">
+                      <a:noFill/>
+                      <a:prstDash val="solid"/>
+                    </a:lnB>
+                    <a:lnTlToBr w="12700" cmpd="sng">
+                      <a:noFill/>
+                      <a:prstDash val="solid"/>
+                    </a:lnTlToBr>
+                    <a:lnBlToTr w="12700" cmpd="sng">
+                      <a:noFill/>
+                      <a:prstDash val="solid"/>
+                    </a:lnBlToTr>
+                  </a:tcPr>
+                </a:tc>
+                <a:tc>
+                  <a:txBody>
+                    <a:bodyPr/>
+                    <a:lstStyle/>
+                    <a:p>
+                      <a:r>
+                        <a:rPr lang="en-US" sz="1200" b="0" u="sng" dirty="0">
+                          <a:solidFill>
+                            <a:schemeClr val="accent2"/>
+                          </a:solidFill>
+                        </a:rPr>
+                        <a:t>Automated Transformation</a:t>
+                      </a:r>
+                    </a:p>
+                  </a:txBody>
+                  <a:tcPr>
+                    <a:lnL w="12700" cap="flat" cmpd="sng" algn="ctr">
+                      <a:solidFill>
+                        <a:schemeClr val="tx1"/>
+                      </a:solidFill>
+                      <a:prstDash val="solid"/>
+                      <a:round/>
+                      <a:headEnd type="none" w="med" len="med"/>
+                      <a:tailEnd type="none" w="med" len="med"/>
+                    </a:lnL>
+                    <a:lnR w="12700" cap="flat" cmpd="sng" algn="ctr">
+                      <a:solidFill>
+                        <a:schemeClr val="tx1"/>
+                      </a:solidFill>
+                      <a:prstDash val="solid"/>
+                      <a:round/>
+                      <a:headEnd type="none" w="med" len="med"/>
+                      <a:tailEnd type="none" w="med" len="med"/>
+                    </a:lnR>
+                    <a:lnT w="12700" cap="flat" cmpd="sng" algn="ctr">
+                      <a:solidFill>
+                        <a:schemeClr val="tx1"/>
+                      </a:solidFill>
+                      <a:prstDash val="solid"/>
+                      <a:round/>
+                      <a:headEnd type="none" w="med" len="med"/>
+                      <a:tailEnd type="none" w="med" len="med"/>
+                    </a:lnT>
+                    <a:lnB w="9525" cap="flat" cmpd="sng" algn="ctr">
+                      <a:noFill/>
+                      <a:prstDash val="solid"/>
+                    </a:lnB>
+                    <a:lnTlToBr w="12700" cmpd="sng">
+                      <a:noFill/>
+                      <a:prstDash val="solid"/>
+                    </a:lnTlToBr>
+                    <a:lnBlToTr w="12700" cmpd="sng">
+                      <a:noFill/>
+                      <a:prstDash val="solid"/>
+                    </a:lnBlToTr>
+                  </a:tcPr>
+                </a:tc>
+                <a:tc>
+                  <a:txBody>
+                    <a:bodyPr/>
+                    <a:lstStyle/>
+                    <a:p>
+                      <a:r>
+                        <a:rPr lang="en-US" sz="1200" b="0" u="sng" dirty="0">
+                          <a:solidFill>
+                            <a:schemeClr val="accent2"/>
+                          </a:solidFill>
+                        </a:rPr>
+                        <a:t>Exploratory Visualization</a:t>
+                      </a:r>
+                    </a:p>
+                  </a:txBody>
+                  <a:tcPr>
+                    <a:lnL w="12700" cap="flat" cmpd="sng" algn="ctr">
+                      <a:solidFill>
+                        <a:schemeClr val="tx1"/>
+                      </a:solidFill>
+                      <a:prstDash val="solid"/>
+                      <a:round/>
+                      <a:headEnd type="none" w="med" len="med"/>
+                      <a:tailEnd type="none" w="med" len="med"/>
+                    </a:lnL>
+                    <a:lnR w="12700" cap="flat" cmpd="sng" algn="ctr">
+                      <a:solidFill>
+                        <a:schemeClr val="tx1"/>
+                      </a:solidFill>
+                      <a:prstDash val="solid"/>
+                      <a:round/>
+                      <a:headEnd type="none" w="med" len="med"/>
+                      <a:tailEnd type="none" w="med" len="med"/>
+                    </a:lnR>
+                    <a:lnT w="12700" cap="flat" cmpd="sng" algn="ctr">
+                      <a:solidFill>
+                        <a:schemeClr val="tx1"/>
+                      </a:solidFill>
+                      <a:prstDash val="solid"/>
+                      <a:round/>
+                      <a:headEnd type="none" w="med" len="med"/>
+                      <a:tailEnd type="none" w="med" len="med"/>
+                    </a:lnT>
+                    <a:lnB w="9525" cap="flat" cmpd="sng" algn="ctr">
+                      <a:noFill/>
+                      <a:prstDash val="solid"/>
+                    </a:lnB>
+                    <a:lnTlToBr w="12700" cmpd="sng">
+                      <a:noFill/>
+                      <a:prstDash val="solid"/>
+                    </a:lnTlToBr>
+                    <a:lnBlToTr w="12700" cmpd="sng">
+                      <a:noFill/>
+                      <a:prstDash val="solid"/>
+                    </a:lnBlToTr>
+                  </a:tcPr>
+                </a:tc>
+                <a:tc>
+                  <a:txBody>
+                    <a:bodyPr/>
+                    <a:lstStyle/>
+                    <a:p>
+                      <a:r>
+                        <a:rPr lang="en-US" sz="1200" b="0" u="sng" dirty="0">
+                          <a:solidFill>
+                            <a:schemeClr val="accent2"/>
+                          </a:solidFill>
+                        </a:rPr>
+                        <a:t>Analysis &amp; Evaluation</a:t>
+                      </a:r>
+                    </a:p>
+                  </a:txBody>
+                  <a:tcPr>
+                    <a:lnL w="12700" cap="flat" cmpd="sng" algn="ctr">
+                      <a:solidFill>
+                        <a:schemeClr val="tx1"/>
+                      </a:solidFill>
+                      <a:prstDash val="solid"/>
+                      <a:round/>
+                      <a:headEnd type="none" w="med" len="med"/>
+                      <a:tailEnd type="none" w="med" len="med"/>
+                    </a:lnL>
+                    <a:lnR w="12700" cap="flat" cmpd="sng" algn="ctr">
+                      <a:solidFill>
+                        <a:schemeClr val="tx1"/>
+                      </a:solidFill>
+                      <a:prstDash val="solid"/>
+                      <a:round/>
+                      <a:headEnd type="none" w="med" len="med"/>
+                      <a:tailEnd type="none" w="med" len="med"/>
+                    </a:lnR>
+                    <a:lnT w="12700" cap="flat" cmpd="sng" algn="ctr">
+                      <a:solidFill>
+                        <a:schemeClr val="tx1"/>
+                      </a:solidFill>
+                      <a:prstDash val="solid"/>
+                      <a:round/>
+                      <a:headEnd type="none" w="med" len="med"/>
+                      <a:tailEnd type="none" w="med" len="med"/>
+                    </a:lnT>
+                    <a:lnB w="9525" cap="flat" cmpd="sng" algn="ctr">
+                      <a:noFill/>
+                      <a:prstDash val="solid"/>
+                    </a:lnB>
+                    <a:lnTlToBr w="12700" cmpd="sng">
+                      <a:noFill/>
+                      <a:prstDash val="solid"/>
+                    </a:lnTlToBr>
+                    <a:lnBlToTr w="12700" cmpd="sng">
+                      <a:noFill/>
+                      <a:prstDash val="solid"/>
+                    </a:lnBlToTr>
+                  </a:tcPr>
+                </a:tc>
+                <a:extLst>
+                  <a:ext uri="{0D108BD9-81ED-4DB2-BD59-A6C34878D82A}">
+                    <a16:rowId xmlns:a16="http://schemas.microsoft.com/office/drawing/2014/main" val="1882384890"/>
+                  </a:ext>
+                </a:extLst>
+              </a:tr>
+              <a:tr h="370840">
+                <a:tc>
+                  <a:txBody>
+                    <a:bodyPr/>
+                    <a:lstStyle/>
+                    <a:p>
+                      <a:r>
+                        <a:rPr lang="en-US" sz="1200" b="0" dirty="0">
+                          <a:solidFill>
+                            <a:schemeClr val="accent2"/>
+                          </a:solidFill>
+                        </a:rPr>
+                        <a:t>Excel, ChatGPT</a:t>
+                      </a:r>
+                    </a:p>
+                  </a:txBody>
+                  <a:tcPr>
+                    <a:lnL w="12700" cap="flat" cmpd="sng" algn="ctr">
+                      <a:solidFill>
+                        <a:schemeClr val="tx1"/>
+                      </a:solidFill>
+                      <a:prstDash val="solid"/>
+                      <a:round/>
+                      <a:headEnd type="none" w="med" len="med"/>
+                      <a:tailEnd type="none" w="med" len="med"/>
+                    </a:lnL>
+                    <a:lnR w="12700" cap="flat" cmpd="sng" algn="ctr">
+                      <a:solidFill>
+                        <a:schemeClr val="tx1"/>
+                      </a:solidFill>
+                      <a:prstDash val="solid"/>
+                      <a:round/>
+                      <a:headEnd type="none" w="med" len="med"/>
+                      <a:tailEnd type="none" w="med" len="med"/>
+                    </a:lnR>
+                    <a:lnT w="9525" cap="flat" cmpd="sng" algn="ctr">
+                      <a:noFill/>
+                      <a:prstDash val="solid"/>
+                    </a:lnT>
+                    <a:lnB w="12700" cap="flat" cmpd="sng" algn="ctr">
+                      <a:solidFill>
+                        <a:schemeClr val="tx1"/>
+                      </a:solidFill>
+                      <a:prstDash val="solid"/>
+                      <a:round/>
+                      <a:headEnd type="none" w="med" len="med"/>
+                      <a:tailEnd type="none" w="med" len="med"/>
+                    </a:lnB>
+                    <a:lnTlToBr w="12700" cmpd="sng">
+                      <a:noFill/>
+                      <a:prstDash val="solid"/>
+                    </a:lnTlToBr>
+                    <a:lnBlToTr w="12700" cmpd="sng">
+                      <a:noFill/>
+                      <a:prstDash val="solid"/>
+                    </a:lnBlToTr>
+                  </a:tcPr>
+                </a:tc>
+                <a:tc>
+                  <a:txBody>
+                    <a:bodyPr/>
+                    <a:lstStyle/>
+                    <a:p>
+                      <a:r>
+                        <a:rPr lang="en-US" sz="1200" b="0" dirty="0">
+                          <a:solidFill>
+                            <a:schemeClr val="accent2"/>
+                          </a:solidFill>
+                        </a:rPr>
+                        <a:t>Python, esp. pandas</a:t>
+                      </a:r>
+                    </a:p>
+                  </a:txBody>
+                  <a:tcPr>
+                    <a:lnL w="12700" cap="flat" cmpd="sng" algn="ctr">
+                      <a:solidFill>
+                        <a:schemeClr val="tx1"/>
+                      </a:solidFill>
+                      <a:prstDash val="solid"/>
+                      <a:round/>
+                      <a:headEnd type="none" w="med" len="med"/>
+                      <a:tailEnd type="none" w="med" len="med"/>
+                    </a:lnL>
+                    <a:lnR w="12700" cap="flat" cmpd="sng" algn="ctr">
+                      <a:solidFill>
+                        <a:schemeClr val="tx1"/>
+                      </a:solidFill>
+                      <a:prstDash val="solid"/>
+                      <a:round/>
+                      <a:headEnd type="none" w="med" len="med"/>
+                      <a:tailEnd type="none" w="med" len="med"/>
+                    </a:lnR>
+                    <a:lnT w="9525" cap="flat" cmpd="sng" algn="ctr">
+                      <a:noFill/>
+                      <a:prstDash val="solid"/>
+                    </a:lnT>
+                    <a:lnB w="12700" cap="flat" cmpd="sng" algn="ctr">
+                      <a:solidFill>
+                        <a:schemeClr val="tx1"/>
+                      </a:solidFill>
+                      <a:prstDash val="solid"/>
+                      <a:round/>
+                      <a:headEnd type="none" w="med" len="med"/>
+                      <a:tailEnd type="none" w="med" len="med"/>
+                    </a:lnB>
+                    <a:lnTlToBr w="12700" cmpd="sng">
+                      <a:noFill/>
+                      <a:prstDash val="solid"/>
+                    </a:lnTlToBr>
+                    <a:lnBlToTr w="12700" cmpd="sng">
+                      <a:noFill/>
+                      <a:prstDash val="solid"/>
+                    </a:lnBlToTr>
+                  </a:tcPr>
+                </a:tc>
+                <a:tc>
+                  <a:txBody>
+                    <a:bodyPr/>
+                    <a:lstStyle/>
+                    <a:p>
+                      <a:r>
+                        <a:rPr lang="en-US" sz="1200" b="0" dirty="0">
+                          <a:solidFill>
+                            <a:schemeClr val="accent2"/>
+                          </a:solidFill>
+                        </a:rPr>
+                        <a:t>Tableau</a:t>
+                      </a:r>
+                    </a:p>
+                  </a:txBody>
+                  <a:tcPr>
+                    <a:lnL w="12700" cap="flat" cmpd="sng" algn="ctr">
+                      <a:solidFill>
+                        <a:schemeClr val="tx1"/>
+                      </a:solidFill>
+                      <a:prstDash val="solid"/>
+                      <a:round/>
+                      <a:headEnd type="none" w="med" len="med"/>
+                      <a:tailEnd type="none" w="med" len="med"/>
+                    </a:lnL>
+                    <a:lnR w="12700" cap="flat" cmpd="sng" algn="ctr">
+                      <a:solidFill>
+                        <a:schemeClr val="tx1"/>
+                      </a:solidFill>
+                      <a:prstDash val="solid"/>
+                      <a:round/>
+                      <a:headEnd type="none" w="med" len="med"/>
+                      <a:tailEnd type="none" w="med" len="med"/>
+                    </a:lnR>
+                    <a:lnT w="9525" cap="flat" cmpd="sng" algn="ctr">
+                      <a:noFill/>
+                      <a:prstDash val="solid"/>
+                    </a:lnT>
+                    <a:lnB w="12700" cap="flat" cmpd="sng" algn="ctr">
+                      <a:solidFill>
+                        <a:schemeClr val="tx1"/>
+                      </a:solidFill>
+                      <a:prstDash val="solid"/>
+                      <a:round/>
+                      <a:headEnd type="none" w="med" len="med"/>
+                      <a:tailEnd type="none" w="med" len="med"/>
+                    </a:lnB>
+                    <a:lnTlToBr w="12700" cmpd="sng">
+                      <a:noFill/>
+                      <a:prstDash val="solid"/>
+                    </a:lnTlToBr>
+                    <a:lnBlToTr w="12700" cmpd="sng">
+                      <a:noFill/>
+                      <a:prstDash val="solid"/>
+                    </a:lnBlToTr>
+                  </a:tcPr>
+                </a:tc>
+                <a:tc>
+                  <a:txBody>
+                    <a:bodyPr/>
+                    <a:lstStyle/>
+                    <a:p>
+                      <a:r>
+                        <a:rPr lang="en-US" sz="1200" b="0" dirty="0">
+                          <a:solidFill>
+                            <a:schemeClr val="accent2"/>
+                          </a:solidFill>
+                        </a:rPr>
+                        <a:t>Python &amp; R</a:t>
+                      </a:r>
+                    </a:p>
+                  </a:txBody>
+                  <a:tcPr>
+                    <a:lnL w="12700" cap="flat" cmpd="sng" algn="ctr">
+                      <a:solidFill>
+                        <a:schemeClr val="tx1"/>
+                      </a:solidFill>
+                      <a:prstDash val="solid"/>
+                      <a:round/>
+                      <a:headEnd type="none" w="med" len="med"/>
+                      <a:tailEnd type="none" w="med" len="med"/>
+                    </a:lnL>
+                    <a:lnR w="12700" cap="flat" cmpd="sng" algn="ctr">
+                      <a:solidFill>
+                        <a:schemeClr val="tx1"/>
+                      </a:solidFill>
+                      <a:prstDash val="solid"/>
+                      <a:round/>
+                      <a:headEnd type="none" w="med" len="med"/>
+                      <a:tailEnd type="none" w="med" len="med"/>
+                    </a:lnR>
+                    <a:lnT w="9525" cap="flat" cmpd="sng" algn="ctr">
+                      <a:noFill/>
+                      <a:prstDash val="solid"/>
+                    </a:lnT>
+                    <a:lnB w="12700" cap="flat" cmpd="sng" algn="ctr">
+                      <a:solidFill>
+                        <a:schemeClr val="tx1"/>
+                      </a:solidFill>
+                      <a:prstDash val="solid"/>
+                      <a:round/>
+                      <a:headEnd type="none" w="med" len="med"/>
+                      <a:tailEnd type="none" w="med" len="med"/>
+                    </a:lnB>
+                    <a:lnTlToBr w="12700" cmpd="sng">
+                      <a:noFill/>
+                      <a:prstDash val="solid"/>
+                    </a:lnTlToBr>
+                    <a:lnBlToTr w="12700" cmpd="sng">
+                      <a:noFill/>
+                      <a:prstDash val="solid"/>
+                    </a:lnBlToTr>
+                  </a:tcPr>
+                </a:tc>
+                <a:extLst>
+                  <a:ext uri="{0D108BD9-81ED-4DB2-BD59-A6C34878D82A}">
+                    <a16:rowId xmlns:a16="http://schemas.microsoft.com/office/drawing/2014/main" val="1356622816"/>
+                  </a:ext>
+                </a:extLst>
+              </a:tr>
+            </a:tbl>
+          </a:graphicData>
+        </a:graphic>
+      </p:graphicFrame>
     </p:spTree>
     <p:extLst>
       <p:ext uri="{BB962C8B-B14F-4D97-AF65-F5344CB8AC3E}">
@@ -10066,7 +10797,7 @@
 </p:sld>
 </file>
 
-<file path=ppt/slides/slide4.xml><?xml version="1.0" encoding="utf-8"?>
+<file path=ppt/slides/slide5.xml><?xml version="1.0" encoding="utf-8"?>
 <p:sld xmlns:a="http://schemas.openxmlformats.org/drawingml/2006/main" xmlns:r="http://schemas.openxmlformats.org/officeDocument/2006/relationships" xmlns:p="http://schemas.openxmlformats.org/presentationml/2006/main">
   <p:cSld>
     <p:spTree>
@@ -10116,24 +10847,24 @@
             </a:pPr>
             <a:r>
               <a:rPr lang="en-US" sz="1300" b="1" u="sng" dirty="0"/>
-              <a:t>Issues</a:t>
+              <a:t>Steps &amp; Issues</a:t>
             </a:r>
           </a:p>
           <a:p>
             <a:pPr>
               <a:lnSpc>
-                <a:spcPct val="125000"/>
+                <a:spcPct val="150000"/>
               </a:lnSpc>
             </a:pPr>
             <a:r>
               <a:rPr lang="en-US" sz="1300" dirty="0"/>
-              <a:t>Anomalous Values</a:t>
+              <a:t>Anomalous values</a:t>
             </a:r>
           </a:p>
           <a:p>
             <a:pPr lvl="1">
               <a:lnSpc>
-                <a:spcPct val="125000"/>
+                <a:spcPct val="150000"/>
               </a:lnSpc>
             </a:pPr>
             <a:r>
@@ -10144,78 +10875,67 @@
           <a:p>
             <a:pPr lvl="1">
               <a:lnSpc>
-                <a:spcPct val="125000"/>
+                <a:spcPct val="150000"/>
               </a:lnSpc>
             </a:pPr>
             <a:r>
               <a:rPr lang="en-US" dirty="0"/>
-              <a:t>Datetime fields: Inconsistent relative to one another &amp; often far in future</a:t>
+              <a:t>Datetime fields: Inconsistent &amp; often far in future</a:t>
             </a:r>
           </a:p>
           <a:p>
             <a:pPr>
               <a:lnSpc>
-                <a:spcPct val="125000"/>
+                <a:spcPct val="150000"/>
               </a:lnSpc>
             </a:pPr>
             <a:r>
               <a:rPr lang="en-US" sz="1300" dirty="0"/>
-              <a:t>De-identify Candidate ID</a:t>
+              <a:t>Delete invariant &amp; computed fields</a:t>
             </a:r>
           </a:p>
           <a:p>
             <a:pPr>
               <a:lnSpc>
-                <a:spcPct val="125000"/>
+                <a:spcPct val="150000"/>
               </a:lnSpc>
             </a:pPr>
             <a:r>
               <a:rPr lang="en-US" sz="1300" dirty="0"/>
-              <a:t>Delete invariant &amp; computed fields esp. Tag scores</a:t>
+              <a:t>Add question-tag M:N relationship table for joins</a:t>
             </a:r>
           </a:p>
           <a:p>
             <a:pPr>
               <a:lnSpc>
-                <a:spcPct val="125000"/>
+                <a:spcPct val="150000"/>
               </a:lnSpc>
             </a:pPr>
             <a:r>
               <a:rPr lang="en-US" sz="1300" dirty="0"/>
-              <a:t>Add question-tag relationship table for future joins</a:t>
+              <a:t>Sort out major vs. city</a:t>
             </a:r>
           </a:p>
           <a:p>
             <a:pPr>
               <a:lnSpc>
-                <a:spcPct val="125000"/>
+                <a:spcPct val="150000"/>
               </a:lnSpc>
             </a:pPr>
             <a:r>
               <a:rPr lang="en-US" sz="1300" dirty="0"/>
-              <a:t>Sort out major versus city</a:t>
+              <a:t>Impute state from city via ChatGPT</a:t>
             </a:r>
           </a:p>
           <a:p>
             <a:pPr>
               <a:lnSpc>
-                <a:spcPct val="125000"/>
+                <a:spcPct val="150000"/>
               </a:lnSpc>
             </a:pPr>
             <a:r>
               <a:rPr lang="en-US" sz="1300" dirty="0"/>
-              <a:t>Impute state from city via GPT</a:t>
-            </a:r>
-          </a:p>
-          <a:p>
-            <a:pPr>
-              <a:lnSpc>
-                <a:spcPct val="125000"/>
-              </a:lnSpc>
-            </a:pPr>
-            <a:r>
-              <a:rPr lang="en-US" sz="1300" dirty="0"/>
-              <a:t>Clean, consolidate &amp; classify majors - GPT</a:t>
+              <a:t>Clean, consolidate &amp; classify majors - ChatGPT</a:t>
             </a:r>
           </a:p>
           <a:p>
@@ -10241,7 +10961,7 @@
         </p:nvSpPr>
         <p:spPr>
           <a:xfrm>
-            <a:off x="4799371" y="1333451"/>
+            <a:off x="4745875" y="1300389"/>
             <a:ext cx="3999900" cy="3416400"/>
           </a:xfrm>
         </p:spPr>
@@ -10250,6 +10970,9 @@
           <a:lstStyle/>
           <a:p>
             <a:pPr marL="139700" indent="0">
+              <a:lnSpc>
+                <a:spcPct val="150000"/>
+              </a:lnSpc>
               <a:buNone/>
             </a:pPr>
             <a:r>
@@ -10260,7 +10983,7 @@
           <a:p>
             <a:pPr>
               <a:lnSpc>
-                <a:spcPct val="125000"/>
+                <a:spcPct val="150000"/>
               </a:lnSpc>
             </a:pPr>
             <a:r>
@@ -10271,7 +10994,7 @@
           <a:p>
             <a:pPr>
               <a:lnSpc>
-                <a:spcPct val="125000"/>
+                <a:spcPct val="150000"/>
               </a:lnSpc>
             </a:pPr>
             <a:r>
@@ -10282,7 +11005,7 @@
           <a:p>
             <a:pPr>
               <a:lnSpc>
-                <a:spcPct val="125000"/>
+                <a:spcPct val="150000"/>
               </a:lnSpc>
             </a:pPr>
             <a:r>
@@ -10293,30 +11016,23 @@
           <a:p>
             <a:pPr>
               <a:lnSpc>
-                <a:spcPct val="125000"/>
+                <a:spcPct val="150000"/>
               </a:lnSpc>
             </a:pPr>
             <a:r>
               <a:rPr lang="en-US" sz="1300" dirty="0"/>
-              <a:t>Date-times: I surrender!</a:t>
+              <a:t>Are tags accurate?</a:t>
             </a:r>
           </a:p>
           <a:p>
             <a:pPr>
               <a:lnSpc>
-                <a:spcPct val="125000"/>
+                <a:spcPct val="150000"/>
               </a:lnSpc>
             </a:pPr>
             <a:r>
               <a:rPr lang="en-US" sz="1300" dirty="0"/>
-              <a:t>Eye-openers:  Minnesota and non-majors</a:t>
-            </a:r>
-            <a:br>
-              <a:rPr lang="en-US" sz="1300" dirty="0"/>
-            </a:br>
-            <a:r>
-              <a:rPr lang="en-US" sz="1300" dirty="0"/>
-              <a:t>[See Tableau vizzes 1&amp;2]</a:t>
+              <a:t>Datetimes: I surrender!</a:t>
             </a:r>
           </a:p>
         </p:txBody>
@@ -10347,7 +11063,7 @@
             </a:pPr>
             <a:r>
               <a:rPr lang="en-US" dirty="0"/>
-              <a:t>Data Cleaning &amp; Preparation</a:t>
+              <a:t>Data Cleaning &amp; Transformation</a:t>
             </a:r>
           </a:p>
         </p:txBody>
@@ -10384,7 +11100,7 @@
             </a:pPr>
             <a:fld id="{00000000-1234-1234-1234-123412341234}" type="slidenum">
               <a:rPr lang="en" smtClean="0"/>
-              <a:t>4</a:t>
+              <a:t>5</a:t>
             </a:fld>
             <a:endParaRPr lang="en"/>
           </a:p>
@@ -10403,7 +11119,7 @@
 </p:sld>
 </file>
 
-<file path=ppt/slides/slide5.xml><?xml version="1.0" encoding="utf-8"?>
+<file path=ppt/slides/slide6.xml><?xml version="1.0" encoding="utf-8"?>
 <p:sld xmlns:a="http://schemas.openxmlformats.org/drawingml/2006/main" xmlns:r="http://schemas.openxmlformats.org/officeDocument/2006/relationships" xmlns:p="http://schemas.openxmlformats.org/presentationml/2006/main">
   <p:cSld>
     <p:spTree>
@@ -10422,10 +11138,10 @@
       </p:grpSpPr>
       <p:sp>
         <p:nvSpPr>
-          <p:cNvPr id="6" name="Title 5">
+          <p:cNvPr id="4" name="Title 3">
             <a:extLst>
               <a:ext uri="{FF2B5EF4-FFF2-40B4-BE49-F238E27FC236}">
-                <a16:creationId xmlns:a16="http://schemas.microsoft.com/office/drawing/2014/main" id="{CA1AF9D1-1475-DB66-4B53-221F8B009218}"/>
+                <a16:creationId xmlns:a16="http://schemas.microsoft.com/office/drawing/2014/main" id="{045366D3-B106-E1F8-946D-CB73D2809322}"/>
               </a:ext>
             </a:extLst>
           </p:cNvPr>
@@ -10446,17 +11162,17 @@
             </a:pPr>
             <a:r>
               <a:rPr lang="en-US" dirty="0"/>
-              <a:t>Exploratory Visualizations</a:t>
+              <a:t>Exploratory Visualization</a:t>
             </a:r>
           </a:p>
         </p:txBody>
       </p:sp>
       <p:sp>
         <p:nvSpPr>
-          <p:cNvPr id="7" name="Text Placeholder 6">
+          <p:cNvPr id="6" name="Text Placeholder 5">
             <a:extLst>
               <a:ext uri="{FF2B5EF4-FFF2-40B4-BE49-F238E27FC236}">
-                <a16:creationId xmlns:a16="http://schemas.microsoft.com/office/drawing/2014/main" id="{97B65F39-7717-C8D4-AF71-7319EFAEA8FF}"/>
+                <a16:creationId xmlns:a16="http://schemas.microsoft.com/office/drawing/2014/main" id="{88D59FC2-B385-4670-420D-F7D82A898B4C}"/>
               </a:ext>
             </a:extLst>
           </p:cNvPr>
@@ -10467,49 +11183,107 @@
             <p:ph type="body" idx="1"/>
           </p:nvPr>
         </p:nvSpPr>
-        <p:spPr/>
+        <p:spPr>
+          <a:xfrm>
+            <a:off x="434450" y="1413901"/>
+            <a:ext cx="8520600" cy="2964132"/>
+          </a:xfrm>
+        </p:spPr>
         <p:txBody>
           <a:bodyPr/>
           <a:lstStyle/>
           <a:p>
+            <a:pPr>
+              <a:lnSpc>
+                <a:spcPct val="125000"/>
+              </a:lnSpc>
+            </a:pPr>
             <a:r>
               <a:rPr lang="en-US" dirty="0"/>
-              <a:t>Single Variable</a:t>
+              <a:t>See Vizzes at </a:t>
             </a:r>
-          </a:p>
-          <a:p>
-            <a:pPr lvl="1"/>
+            <a:r>
+              <a:rPr lang="en-US" dirty="0">
+                <a:hlinkClick r:id="rId2"/>
+              </a:rPr>
+              <a:t>https://public.tableau.com/app/profile/brian.finnegan/vizzes</a:t>
+            </a:r>
+            <a:br>
+              <a:rPr lang="en-US" dirty="0"/>
+            </a:br>
+            <a:endParaRPr lang="en-US" dirty="0"/>
+          </a:p>
+          <a:p>
+            <a:pPr>
+              <a:lnSpc>
+                <a:spcPct val="125000"/>
+              </a:lnSpc>
+            </a:pPr>
             <a:r>
               <a:rPr lang="en-US" dirty="0"/>
-              <a:t>Scores</a:t>
+              <a:t>Noteworthy (to me) observations:</a:t>
             </a:r>
           </a:p>
           <a:p>
+            <a:pPr lvl="1">
+              <a:lnSpc>
+                <a:spcPct val="150000"/>
+              </a:lnSpc>
+            </a:pPr>
             <a:r>
               <a:rPr lang="en-US" dirty="0"/>
-              <a:t>Relationships</a:t>
+              <a:t>Geographic size &amp; scoring patterns</a:t>
             </a:r>
           </a:p>
           <a:p>
-            <a:pPr lvl="1"/>
+            <a:pPr lvl="1">
+              <a:lnSpc>
+                <a:spcPct val="150000"/>
+              </a:lnSpc>
+            </a:pPr>
             <a:r>
               <a:rPr lang="en-US" dirty="0"/>
-              <a:t>Copy/paste vs score</a:t>
+              <a:t>Score differentials by major</a:t>
             </a:r>
           </a:p>
           <a:p>
-            <a:pPr lvl="1"/>
+            <a:pPr lvl="1">
+              <a:lnSpc>
+                <a:spcPct val="150000"/>
+              </a:lnSpc>
+            </a:pPr>
             <a:r>
               <a:rPr lang="en-US" dirty="0"/>
-              <a:t>Out of window vs score</a:t>
+              <a:t>Distribution of scores</a:t>
             </a:r>
           </a:p>
           <a:p>
-            <a:pPr lvl="1"/>
+            <a:pPr lvl="1">
+              <a:lnSpc>
+                <a:spcPct val="150000"/>
+              </a:lnSpc>
+            </a:pPr>
             <a:r>
               <a:rPr lang="en-US" dirty="0"/>
-              <a:t>Test items by tags</a:t>
+              <a:t>Apparent relationship between copy/pasting &amp; score</a:t>
             </a:r>
+          </a:p>
+          <a:p>
+            <a:pPr lvl="1">
+              <a:lnSpc>
+                <a:spcPct val="150000"/>
+              </a:lnSpc>
+            </a:pPr>
+            <a:r>
+              <a:rPr lang="en-US" dirty="0"/>
+              <a:t>Scores by tag</a:t>
+            </a:r>
+          </a:p>
+          <a:p>
+            <a:endParaRPr lang="en-US" dirty="0"/>
+          </a:p>
+          <a:p>
+            <a:endParaRPr lang="en-US" dirty="0"/>
           </a:p>
         </p:txBody>
       </p:sp>
@@ -10518,7 +11292,7 @@
           <p:cNvPr id="5" name="Slide Number Placeholder 4">
             <a:extLst>
               <a:ext uri="{FF2B5EF4-FFF2-40B4-BE49-F238E27FC236}">
-                <a16:creationId xmlns:a16="http://schemas.microsoft.com/office/drawing/2014/main" id="{36664EC1-1E74-F995-0EBD-ED70BBEFCD06}"/>
+                <a16:creationId xmlns:a16="http://schemas.microsoft.com/office/drawing/2014/main" id="{AE99207C-B1CB-07A5-3411-37EE76B84CDF}"/>
               </a:ext>
             </a:extLst>
           </p:cNvPr>
@@ -10545,7 +11319,7 @@
             </a:pPr>
             <a:fld id="{00000000-1234-1234-1234-123412341234}" type="slidenum">
               <a:rPr lang="en" smtClean="0"/>
-              <a:t>5</a:t>
+              <a:t>6</a:t>
             </a:fld>
             <a:endParaRPr lang="en"/>
           </a:p>
@@ -10554,7 +11328,7 @@
     </p:spTree>
     <p:extLst>
       <p:ext uri="{BB962C8B-B14F-4D97-AF65-F5344CB8AC3E}">
-        <p14:creationId xmlns:p14="http://schemas.microsoft.com/office/powerpoint/2010/main" val="4272527371"/>
+        <p14:creationId xmlns:p14="http://schemas.microsoft.com/office/powerpoint/2010/main" val="3215201335"/>
       </p:ext>
     </p:extLst>
   </p:cSld>
@@ -10564,7 +11338,7 @@
 </p:sld>
 </file>
 
-<file path=ppt/slides/slide6.xml><?xml version="1.0" encoding="utf-8"?>
+<file path=ppt/slides/slide7.xml><?xml version="1.0" encoding="utf-8"?>
 <p:sld xmlns:a="http://schemas.openxmlformats.org/drawingml/2006/main" xmlns:r="http://schemas.openxmlformats.org/officeDocument/2006/relationships" xmlns:p="http://schemas.openxmlformats.org/presentationml/2006/main">
   <p:cSld>
     <p:spTree>
@@ -10635,6 +11409,12 @@
           <a:p>
             <a:r>
               <a:rPr lang="en-US" dirty="0"/>
+              <a:t>See code notebooks</a:t>
+            </a:r>
+          </a:p>
+          <a:p>
+            <a:r>
+              <a:rPr lang="en-US" dirty="0"/>
               <a:t>Copy/paste plagiarism?</a:t>
             </a:r>
           </a:p>
@@ -10653,6 +11433,13 @@
             </a:r>
           </a:p>
           <a:p>
+            <a:pPr lvl="1"/>
+            <a:r>
+              <a:rPr lang="en-US" dirty="0"/>
+              <a:t>Bottom line: copy/paste associated with higher scores</a:t>
+            </a:r>
+          </a:p>
+          <a:p>
             <a:r>
               <a:rPr lang="en-US" dirty="0"/>
               <a:t>Item-level analysis</a:t>
@@ -10676,7 +11463,14 @@
             <a:pPr lvl="1"/>
             <a:r>
               <a:rPr lang="en-US" dirty="0"/>
-              <a:t>Item Level Analysis</a:t>
+              <a:t>Item Response Theory</a:t>
+            </a:r>
+          </a:p>
+          <a:p>
+            <a:pPr lvl="1"/>
+            <a:r>
+              <a:rPr lang="en-US" dirty="0"/>
+              <a:t>Bottom line: current test has strengths and weaknesses</a:t>
             </a:r>
           </a:p>
         </p:txBody>
@@ -10713,7 +11507,7 @@
             </a:pPr>
             <a:fld id="{00000000-1234-1234-1234-123412341234}" type="slidenum">
               <a:rPr lang="en" smtClean="0"/>
-              <a:t>6</a:t>
+              <a:t>7</a:t>
             </a:fld>
             <a:endParaRPr lang="en"/>
           </a:p>
@@ -10732,7 +11526,7 @@
 </p:sld>
 </file>
 
-<file path=ppt/slides/slide7.xml><?xml version="1.0" encoding="utf-8"?>
+<file path=ppt/slides/slide8.xml><?xml version="1.0" encoding="utf-8"?>
 <p:sld xmlns:a="http://schemas.openxmlformats.org/drawingml/2006/main" xmlns:r="http://schemas.openxmlformats.org/officeDocument/2006/relationships" xmlns:p="http://schemas.openxmlformats.org/presentationml/2006/main">
   <p:cSld>
     <p:spTree>
@@ -10801,46 +11595,66 @@
           <a:bodyPr/>
           <a:lstStyle/>
           <a:p>
+            <a:pPr>
+              <a:lnSpc>
+                <a:spcPct val="125000"/>
+              </a:lnSpc>
+            </a:pPr>
             <a:r>
               <a:rPr lang="en-US" dirty="0"/>
-              <a:t>Familiarity with data and their context limited – huge consideration</a:t>
+              <a:t>Familiarity with data and their context limited</a:t>
             </a:r>
           </a:p>
           <a:p>
+            <a:pPr>
+              <a:lnSpc>
+                <a:spcPct val="125000"/>
+              </a:lnSpc>
+            </a:pPr>
             <a:r>
               <a:rPr lang="en-US" dirty="0"/>
               <a:t>Hints, glimpses, &amp; issues for investigation only; no conclusions</a:t>
             </a:r>
           </a:p>
           <a:p>
-            <a:pPr lvl="1"/>
-            <a:r>
-              <a:rPr lang="en-US" dirty="0"/>
-              <a:t>Participant preparedness / performance?</a:t>
-            </a:r>
-          </a:p>
-          <a:p>
-            <a:pPr lvl="1"/>
+            <a:pPr lvl="1">
+              <a:lnSpc>
+                <a:spcPct val="125000"/>
+              </a:lnSpc>
+            </a:pPr>
             <a:r>
               <a:rPr lang="en-US" dirty="0"/>
               <a:t>Local teaching &amp; learning and/or participant supply circumstances?</a:t>
             </a:r>
           </a:p>
           <a:p>
-            <a:pPr lvl="1"/>
+            <a:pPr lvl="1">
+              <a:lnSpc>
+                <a:spcPct val="125000"/>
+              </a:lnSpc>
+            </a:pPr>
             <a:r>
               <a:rPr lang="en-US" dirty="0"/>
               <a:t>Copy &amp; paste an issue?</a:t>
             </a:r>
           </a:p>
           <a:p>
-            <a:pPr lvl="1"/>
+            <a:pPr lvl="1">
+              <a:lnSpc>
+                <a:spcPct val="125000"/>
+              </a:lnSpc>
+            </a:pPr>
             <a:r>
               <a:rPr lang="en-US" dirty="0"/>
               <a:t>Possible test effectiveness opportunities?</a:t>
             </a:r>
           </a:p>
           <a:p>
+            <a:pPr>
+              <a:lnSpc>
+                <a:spcPct val="125000"/>
+              </a:lnSpc>
+            </a:pPr>
             <a:r>
               <a:rPr lang="en-US" dirty="0"/>
               <a:t>What </a:t>
@@ -10855,13 +11669,22 @@
             </a:r>
           </a:p>
           <a:p>
-            <a:pPr lvl="1"/>
+            <a:pPr lvl="1">
+              <a:lnSpc>
+                <a:spcPct val="125000"/>
+              </a:lnSpc>
+            </a:pPr>
             <a:r>
               <a:rPr lang="en-US" dirty="0"/>
               <a:t>80/20 rule &amp; cleaning/wrangling as biggest time/effort sink!</a:t>
             </a:r>
           </a:p>
           <a:p>
+            <a:pPr>
+              <a:lnSpc>
+                <a:spcPct val="125000"/>
+              </a:lnSpc>
+            </a:pPr>
             <a:r>
               <a:rPr lang="en-US" dirty="0"/>
               <a:t>What I </a:t>
@@ -10876,10 +11699,25 @@
             </a:r>
           </a:p>
           <a:p>
-            <a:pPr lvl="1"/>
+            <a:pPr lvl="1">
+              <a:lnSpc>
+                <a:spcPct val="125000"/>
+              </a:lnSpc>
+            </a:pPr>
             <a:r>
               <a:rPr lang="en-US" dirty="0"/>
               <a:t>My robust, versatile data analysis skills and experience in related contexts</a:t>
+            </a:r>
+          </a:p>
+          <a:p>
+            <a:pPr>
+              <a:lnSpc>
+                <a:spcPct val="125000"/>
+              </a:lnSpc>
+            </a:pPr>
+            <a:r>
+              <a:rPr lang="en-US" dirty="0"/>
+              <a:t>If I had twice as much time, I would …</a:t>
             </a:r>
           </a:p>
         </p:txBody>
@@ -10916,7 +11754,7 @@
             </a:pPr>
             <a:fld id="{00000000-1234-1234-1234-123412341234}" type="slidenum">
               <a:rPr lang="en" smtClean="0"/>
-              <a:t>7</a:t>
+              <a:t>8</a:t>
             </a:fld>
             <a:endParaRPr lang="en"/>
           </a:p>
@@ -10935,7 +11773,7 @@
 </p:sld>
 </file>
 
-<file path=ppt/slides/slide8.xml><?xml version="1.0" encoding="utf-8"?>
+<file path=ppt/slides/slide9.xml><?xml version="1.0" encoding="utf-8"?>
 <p:sld xmlns:a="http://schemas.openxmlformats.org/drawingml/2006/main" xmlns:r="http://schemas.openxmlformats.org/officeDocument/2006/relationships" xmlns:p="http://schemas.openxmlformats.org/presentationml/2006/main">
   <p:cSld>
     <p:spTree>
@@ -11020,7 +11858,7 @@
             </a:pPr>
             <a:fld id="{00000000-1234-1234-1234-123412341234}" type="slidenum">
               <a:rPr lang="en" smtClean="0"/>
-              <a:t>8</a:t>
+              <a:t>9</a:t>
             </a:fld>
             <a:endParaRPr lang="en"/>
           </a:p>
@@ -11054,6 +11892,14 @@
           <a:prstGeom prst="rect">
             <a:avLst/>
           </a:prstGeom>
+          <a:effectLst>
+            <a:glow rad="63500">
+              <a:schemeClr val="accent1">
+                <a:satMod val="175000"/>
+                <a:alpha val="40000"/>
+              </a:schemeClr>
+            </a:glow>
+          </a:effectLst>
         </p:spPr>
       </p:pic>
     </p:spTree>

</xml_diff>

<commit_message>
Final final presentation changes
</commit_message>
<xml_diff>
--- a/Presentation/Finnegan_Sr_Mgr_Learner_Eval&Analytics_Thought_Exercise.pptx
+++ b/Presentation/Finnegan_Sr_Mgr_Learner_Eval&Analytics_Thought_Exercise.pptx
@@ -910,6 +910,72 @@
         </p:txBody>
       </p:sp>
     </p:spTree>
+  </p:cSld>
+  <p:clrMapOvr>
+    <a:masterClrMapping/>
+  </p:clrMapOvr>
+</p:notes>
+</file>
+
+<file path=ppt/notesSlides/notesSlide3.xml><?xml version="1.0" encoding="utf-8"?>
+<p:notes xmlns:a="http://schemas.openxmlformats.org/drawingml/2006/main" xmlns:r="http://schemas.openxmlformats.org/officeDocument/2006/relationships" xmlns:p="http://schemas.openxmlformats.org/presentationml/2006/main">
+  <p:cSld>
+    <p:spTree>
+      <p:nvGrpSpPr>
+        <p:cNvPr id="1" name=""/>
+        <p:cNvGrpSpPr/>
+        <p:nvPr/>
+      </p:nvGrpSpPr>
+      <p:grpSpPr>
+        <a:xfrm>
+          <a:off x="0" y="0"/>
+          <a:ext cx="0" cy="0"/>
+          <a:chOff x="0" y="0"/>
+          <a:chExt cx="0" cy="0"/>
+        </a:xfrm>
+      </p:grpSpPr>
+      <p:sp>
+        <p:nvSpPr>
+          <p:cNvPr id="2" name="Slide Image Placeholder 1"/>
+          <p:cNvSpPr>
+            <a:spLocks noGrp="1" noRot="1" noChangeAspect="1"/>
+          </p:cNvSpPr>
+          <p:nvPr>
+            <p:ph type="sldImg"/>
+          </p:nvPr>
+        </p:nvSpPr>
+        <p:spPr>
+          <a:xfrm>
+            <a:off x="381000" y="685800"/>
+            <a:ext cx="6096000" cy="3429000"/>
+          </a:xfrm>
+        </p:spPr>
+      </p:sp>
+      <p:sp>
+        <p:nvSpPr>
+          <p:cNvPr id="3" name="Notes Placeholder 2"/>
+          <p:cNvSpPr>
+            <a:spLocks noGrp="1"/>
+          </p:cNvSpPr>
+          <p:nvPr>
+            <p:ph type="body" idx="1"/>
+          </p:nvPr>
+        </p:nvSpPr>
+        <p:spPr/>
+        <p:txBody>
+          <a:bodyPr/>
+          <a:lstStyle/>
+          <a:p>
+            <a:endParaRPr lang="en-US" dirty="0"/>
+          </a:p>
+        </p:txBody>
+      </p:sp>
+    </p:spTree>
+    <p:extLst>
+      <p:ext uri="{BB962C8B-B14F-4D97-AF65-F5344CB8AC3E}">
+        <p14:creationId xmlns:p14="http://schemas.microsoft.com/office/powerpoint/2010/main" val="2038281700"/>
+      </p:ext>
+    </p:extLst>
   </p:cSld>
   <p:clrMapOvr>
     <a:masterClrMapping/>
@@ -11200,11 +11266,11 @@
             </a:pPr>
             <a:r>
               <a:rPr lang="en-US" dirty="0"/>
-              <a:t>See Vizzes at </a:t>
+              <a:t>See vizzes at </a:t>
             </a:r>
             <a:r>
               <a:rPr lang="en-US" dirty="0">
-                <a:hlinkClick r:id="rId2"/>
+                <a:hlinkClick r:id="rId3"/>
               </a:rPr>
               <a:t>https://public.tableau.com/app/profile/brian.finnegan/vizzes</a:t>
             </a:r>
@@ -11221,7 +11287,7 @@
             </a:pPr>
             <a:r>
               <a:rPr lang="en-US" dirty="0"/>
-              <a:t>Noteworthy (to me) observations:</a:t>
+              <a:t>Noteworthy observations:</a:t>
             </a:r>
           </a:p>
           <a:p>
@@ -11409,12 +11475,6 @@
           <a:p>
             <a:r>
               <a:rPr lang="en-US" dirty="0"/>
-              <a:t>See code notebooks</a:t>
-            </a:r>
-          </a:p>
-          <a:p>
-            <a:r>
-              <a:rPr lang="en-US" dirty="0"/>
               <a:t>Copy/paste plagiarism?</a:t>
             </a:r>
           </a:p>
@@ -11472,6 +11532,18 @@
               <a:rPr lang="en-US" dirty="0"/>
               <a:t>Bottom line: current test has strengths and weaknesses</a:t>
             </a:r>
+          </a:p>
+          <a:p>
+            <a:r>
+              <a:rPr lang="en-US" dirty="0"/>
+              <a:t>[See code notebooks]</a:t>
+            </a:r>
+          </a:p>
+          <a:p>
+            <a:pPr marL="127000" indent="0">
+              <a:buNone/>
+            </a:pPr>
+            <a:endParaRPr lang="en-US" dirty="0"/>
           </a:p>
         </p:txBody>
       </p:sp>
@@ -11569,7 +11641,7 @@
             </a:pPr>
             <a:r>
               <a:rPr lang="en-US" dirty="0"/>
-              <a:t>Limitations and Conclusions</a:t>
+              <a:t>Conclusions</a:t>
             </a:r>
           </a:p>
         </p:txBody>
@@ -11602,7 +11674,7 @@
             </a:pPr>
             <a:r>
               <a:rPr lang="en-US" dirty="0"/>
-              <a:t>Familiarity with data and their context limited</a:t>
+              <a:t>Huge limitation: familiarity with data and their context is limited</a:t>
             </a:r>
           </a:p>
           <a:p>
@@ -11613,8 +11685,13 @@
             </a:pPr>
             <a:r>
               <a:rPr lang="en-US" dirty="0"/>
-              <a:t>Hints, glimpses, &amp; issues for investigation only; no conclusions</a:t>
+              <a:t>Hints, glimpses, &amp; issues </a:t>
             </a:r>
+            <a:r>
+              <a:rPr lang="en-US"/>
+              <a:t>for further investigation:</a:t>
+            </a:r>
+            <a:endParaRPr lang="en-US" dirty="0"/>
           </a:p>
           <a:p>
             <a:pPr lvl="1">

</xml_diff>